<commit_message>
notities toegevoegt voor mijn deel
</commit_message>
<xml_diff>
--- a/Networking Advanced - Chapter5 - NAT.pptx
+++ b/Networking Advanced - Chapter5 - NAT.pptx
@@ -1164,7 +1164,40 @@
               <a:buFontTx/>
               <a:buNone/>
             </a:pPr>
-            <a:endParaRPr lang="en-US" b="1" dirty="0"/>
+            <a:r>
+              <a:rPr lang="en-US" b="1" dirty="0" err="1"/>
+              <a:t>Verschilende</a:t>
+            </a:r>
+            <a:r>
+              <a:rPr lang="en-US" b="1" dirty="0"/>
+              <a:t> types </a:t>
+            </a:r>
+            <a:r>
+              <a:rPr lang="en-US" b="1" dirty="0" err="1"/>
+              <a:t>nat</a:t>
+            </a:r>
+            <a:r>
+              <a:rPr lang="en-US" b="1" dirty="0"/>
+              <a:t>:</a:t>
+            </a:r>
+          </a:p>
+          <a:p>
+            <a:pPr>
+              <a:buFontTx/>
+              <a:buNone/>
+            </a:pPr>
+            <a:r>
+              <a:rPr lang="en-US" b="1" dirty="0"/>
+              <a:t>Static NAT, dynamic NAT </a:t>
+            </a:r>
+            <a:r>
+              <a:rPr lang="en-US" b="1" dirty="0" err="1"/>
+              <a:t>en</a:t>
+            </a:r>
+            <a:r>
+              <a:rPr lang="en-US" b="1" dirty="0"/>
+              <a:t> PAT = NAT overloading</a:t>
+            </a:r>
           </a:p>
         </p:txBody>
       </p:sp>
@@ -1272,7 +1305,416 @@
               <a:buFontTx/>
               <a:buNone/>
             </a:pPr>
-            <a:endParaRPr lang="en-US" b="1" dirty="0"/>
+            <a:r>
+              <a:rPr lang="en-US" b="1" dirty="0" err="1"/>
+              <a:t>Hier</a:t>
+            </a:r>
+            <a:r>
+              <a:rPr lang="en-US" b="1" dirty="0"/>
+              <a:t> is router R2 </a:t>
+            </a:r>
+            <a:r>
+              <a:rPr lang="en-US" b="1" dirty="0" err="1"/>
+              <a:t>geconfiguereerd</a:t>
+            </a:r>
+            <a:r>
+              <a:rPr lang="en-US" b="1" dirty="0"/>
+              <a:t> met static mappings </a:t>
+            </a:r>
+            <a:r>
+              <a:rPr lang="en-US" b="1" dirty="0" err="1"/>
+              <a:t>voor</a:t>
+            </a:r>
+            <a:r>
+              <a:rPr lang="en-US" b="1" dirty="0"/>
+              <a:t> de inside local addresses van server1, PC2 </a:t>
+            </a:r>
+            <a:r>
+              <a:rPr lang="en-US" b="1" dirty="0" err="1"/>
+              <a:t>en</a:t>
+            </a:r>
+            <a:r>
+              <a:rPr lang="en-US" b="1" dirty="0"/>
+              <a:t> PC3.</a:t>
+            </a:r>
+          </a:p>
+          <a:p>
+            <a:pPr>
+              <a:buFontTx/>
+              <a:buNone/>
+            </a:pPr>
+            <a:r>
+              <a:rPr lang="en-US" b="1" dirty="0" err="1"/>
+              <a:t>Wanneer</a:t>
+            </a:r>
+            <a:r>
+              <a:rPr lang="en-US" b="1" dirty="0"/>
+              <a:t> </a:t>
+            </a:r>
+            <a:r>
+              <a:rPr lang="en-US" b="1" dirty="0" err="1"/>
+              <a:t>deze</a:t>
+            </a:r>
+            <a:r>
+              <a:rPr lang="en-US" b="1" dirty="0"/>
+              <a:t> </a:t>
+            </a:r>
+            <a:r>
+              <a:rPr lang="en-US" b="1" dirty="0" err="1"/>
+              <a:t>apperaten</a:t>
+            </a:r>
+            <a:r>
+              <a:rPr lang="en-US" b="1" dirty="0"/>
+              <a:t> </a:t>
+            </a:r>
+            <a:r>
+              <a:rPr lang="en-US" b="1" dirty="0" err="1"/>
+              <a:t>toegang</a:t>
+            </a:r>
+            <a:r>
+              <a:rPr lang="en-US" b="1" dirty="0"/>
+              <a:t> </a:t>
+            </a:r>
+            <a:r>
+              <a:rPr lang="en-US" b="1" dirty="0" err="1"/>
+              <a:t>willen</a:t>
+            </a:r>
+            <a:r>
+              <a:rPr lang="en-US" b="1" dirty="0"/>
+              <a:t> tot het internet </a:t>
+            </a:r>
+            <a:r>
+              <a:rPr lang="en-US" b="1" dirty="0" err="1"/>
+              <a:t>wordt</a:t>
+            </a:r>
+            <a:r>
+              <a:rPr lang="en-US" b="1" dirty="0"/>
+              <a:t> </a:t>
+            </a:r>
+            <a:r>
+              <a:rPr lang="en-US" b="1" dirty="0" err="1"/>
+              <a:t>hun</a:t>
+            </a:r>
+            <a:r>
+              <a:rPr lang="en-US" b="1" dirty="0"/>
+              <a:t> inside local address </a:t>
+            </a:r>
+            <a:r>
+              <a:rPr lang="en-US" b="1" dirty="0" err="1"/>
+              <a:t>vertaald</a:t>
+            </a:r>
+            <a:r>
+              <a:rPr lang="en-US" b="1" dirty="0"/>
+              <a:t> </a:t>
+            </a:r>
+            <a:r>
+              <a:rPr lang="en-US" b="1" dirty="0" err="1"/>
+              <a:t>naar</a:t>
+            </a:r>
+            <a:r>
+              <a:rPr lang="en-US" b="1" dirty="0"/>
+              <a:t> het </a:t>
+            </a:r>
+            <a:r>
+              <a:rPr lang="en-US" b="1" dirty="0" err="1"/>
+              <a:t>geconfigureerde</a:t>
+            </a:r>
+            <a:r>
+              <a:rPr lang="en-US" b="1" dirty="0"/>
+              <a:t> inside global address.</a:t>
+            </a:r>
+          </a:p>
+          <a:p>
+            <a:pPr>
+              <a:buFontTx/>
+              <a:buNone/>
+            </a:pPr>
+            <a:r>
+              <a:rPr lang="en-US" b="1" dirty="0"/>
+              <a:t>De </a:t>
+            </a:r>
+            <a:r>
+              <a:rPr lang="en-US" b="1" dirty="0" err="1"/>
+              <a:t>apparaten</a:t>
+            </a:r>
+            <a:r>
+              <a:rPr lang="en-US" b="1" dirty="0"/>
+              <a:t> op het </a:t>
+            </a:r>
+            <a:r>
+              <a:rPr lang="en-US" b="1" dirty="0" err="1"/>
+              <a:t>externe</a:t>
+            </a:r>
+            <a:r>
+              <a:rPr lang="en-US" b="1" dirty="0"/>
+              <a:t> network </a:t>
+            </a:r>
+            <a:r>
+              <a:rPr lang="en-US" b="1" dirty="0" err="1"/>
+              <a:t>zien</a:t>
+            </a:r>
+            <a:r>
+              <a:rPr lang="en-US" b="1" dirty="0"/>
+              <a:t> </a:t>
+            </a:r>
+            <a:r>
+              <a:rPr lang="en-US" b="1" dirty="0" err="1"/>
+              <a:t>alleen</a:t>
+            </a:r>
+            <a:r>
+              <a:rPr lang="en-US" b="1" dirty="0"/>
+              <a:t> het public IPv4 address.</a:t>
+            </a:r>
+          </a:p>
+          <a:p>
+            <a:pPr>
+              <a:buFontTx/>
+              <a:buNone/>
+            </a:pPr>
+            <a:r>
+              <a:rPr lang="en-US" b="1" dirty="0" err="1"/>
+              <a:t>Handig</a:t>
+            </a:r>
+            <a:r>
+              <a:rPr lang="en-US" b="1" dirty="0"/>
+              <a:t> </a:t>
+            </a:r>
+            <a:r>
+              <a:rPr lang="en-US" b="1" dirty="0" err="1"/>
+              <a:t>voor</a:t>
+            </a:r>
+            <a:r>
+              <a:rPr lang="en-US" b="1" dirty="0"/>
+              <a:t> servers die 24/7 </a:t>
+            </a:r>
+            <a:r>
+              <a:rPr lang="en-US" b="1" dirty="0" err="1"/>
+              <a:t>beschikbaar</a:t>
+            </a:r>
+            <a:r>
+              <a:rPr lang="en-US" b="1" dirty="0"/>
+              <a:t> </a:t>
+            </a:r>
+            <a:r>
+              <a:rPr lang="en-US" b="1" dirty="0" err="1"/>
+              <a:t>moeten</a:t>
+            </a:r>
+            <a:r>
+              <a:rPr lang="en-US" b="1" dirty="0"/>
+              <a:t> </a:t>
+            </a:r>
+            <a:r>
+              <a:rPr lang="en-US" b="1" dirty="0" err="1"/>
+              <a:t>zijn</a:t>
+            </a:r>
+            <a:r>
+              <a:rPr lang="en-US" b="1" dirty="0"/>
+              <a:t> </a:t>
+            </a:r>
+            <a:r>
+              <a:rPr lang="en-US" b="1" dirty="0" err="1"/>
+              <a:t>vanaf</a:t>
+            </a:r>
+            <a:r>
+              <a:rPr lang="en-US" b="1" dirty="0"/>
+              <a:t> het internet. Vb. </a:t>
+            </a:r>
+            <a:r>
+              <a:rPr lang="en-US" b="1" dirty="0" err="1"/>
+              <a:t>Een</a:t>
+            </a:r>
+            <a:r>
+              <a:rPr lang="en-US" b="1" dirty="0"/>
+              <a:t> network administrator op PC4 </a:t>
+            </a:r>
+            <a:r>
+              <a:rPr lang="en-US" b="1" dirty="0" err="1"/>
+              <a:t>kan</a:t>
+            </a:r>
+            <a:r>
+              <a:rPr lang="en-US" b="1" dirty="0"/>
+              <a:t> </a:t>
+            </a:r>
+            <a:r>
+              <a:rPr lang="en-US" b="1" dirty="0" err="1"/>
+              <a:t>een</a:t>
+            </a:r>
+            <a:r>
+              <a:rPr lang="en-US" b="1" dirty="0"/>
+              <a:t> SSH request </a:t>
+            </a:r>
+            <a:r>
+              <a:rPr lang="en-US" b="1" dirty="0" err="1"/>
+              <a:t>naar</a:t>
+            </a:r>
+            <a:r>
+              <a:rPr lang="en-US" b="1" dirty="0"/>
+              <a:t> server1 </a:t>
+            </a:r>
+            <a:r>
+              <a:rPr lang="en-US" b="1" dirty="0" err="1"/>
+              <a:t>sturen</a:t>
+            </a:r>
+            <a:r>
+              <a:rPr lang="en-US" b="1" dirty="0"/>
+              <a:t> met </a:t>
+            </a:r>
+            <a:r>
+              <a:rPr lang="en-US" b="1" dirty="0" err="1"/>
+              <a:t>behulp</a:t>
+            </a:r>
+            <a:r>
+              <a:rPr lang="en-US" b="1" dirty="0"/>
+              <a:t> van het inside global address 209,165,200,226.</a:t>
+            </a:r>
+          </a:p>
+          <a:p>
+            <a:pPr>
+              <a:buFontTx/>
+              <a:buNone/>
+            </a:pPr>
+            <a:r>
+              <a:rPr lang="en-US" b="1" dirty="0"/>
+              <a:t>R2 </a:t>
+            </a:r>
+            <a:r>
+              <a:rPr lang="en-US" b="1" dirty="0" err="1"/>
+              <a:t>vertaald</a:t>
+            </a:r>
+            <a:r>
+              <a:rPr lang="en-US" b="1" dirty="0"/>
+              <a:t> </a:t>
+            </a:r>
+            <a:r>
+              <a:rPr lang="en-US" b="1" dirty="0" err="1"/>
+              <a:t>dit</a:t>
+            </a:r>
+            <a:r>
+              <a:rPr lang="en-US" b="1" dirty="0"/>
+              <a:t> inside global address </a:t>
+            </a:r>
+            <a:r>
+              <a:rPr lang="en-US" b="1" dirty="0" err="1"/>
+              <a:t>naar</a:t>
+            </a:r>
+            <a:r>
+              <a:rPr lang="en-US" b="1" dirty="0"/>
+              <a:t> het inside local address </a:t>
+            </a:r>
+            <a:r>
+              <a:rPr lang="en-US" b="1" dirty="0" err="1"/>
+              <a:t>en</a:t>
+            </a:r>
+            <a:r>
+              <a:rPr lang="en-US" b="1" dirty="0"/>
+              <a:t> </a:t>
+            </a:r>
+            <a:r>
+              <a:rPr lang="en-US" b="1" dirty="0" err="1"/>
+              <a:t>verbind</a:t>
+            </a:r>
+            <a:r>
+              <a:rPr lang="en-US" b="1" dirty="0"/>
+              <a:t> de network administrator met Svr1.</a:t>
+            </a:r>
+          </a:p>
+          <a:p>
+            <a:pPr>
+              <a:buFontTx/>
+              <a:buNone/>
+            </a:pPr>
+            <a:r>
+              <a:rPr lang="en-US" b="1" dirty="0"/>
+              <a:t>Static </a:t>
+            </a:r>
+            <a:r>
+              <a:rPr lang="en-US" b="1" dirty="0" err="1"/>
+              <a:t>nat</a:t>
+            </a:r>
+            <a:r>
+              <a:rPr lang="en-US" b="1" dirty="0"/>
+              <a:t> </a:t>
+            </a:r>
+            <a:r>
+              <a:rPr lang="en-US" b="1" dirty="0" err="1"/>
+              <a:t>heeft</a:t>
+            </a:r>
+            <a:r>
+              <a:rPr lang="en-US" b="1" dirty="0"/>
+              <a:t> </a:t>
+            </a:r>
+            <a:r>
+              <a:rPr lang="en-US" b="1" dirty="0" err="1"/>
+              <a:t>genoeg</a:t>
+            </a:r>
+            <a:r>
+              <a:rPr lang="en-US" b="1" dirty="0"/>
+              <a:t> public addresses </a:t>
+            </a:r>
+            <a:r>
+              <a:rPr lang="en-US" b="1" dirty="0" err="1"/>
+              <a:t>nodig</a:t>
+            </a:r>
+            <a:r>
+              <a:rPr lang="en-US" b="1" dirty="0"/>
+              <a:t> om het </a:t>
+            </a:r>
+            <a:r>
+              <a:rPr lang="en-US" b="1" dirty="0" err="1"/>
+              <a:t>aantal</a:t>
+            </a:r>
+            <a:r>
+              <a:rPr lang="en-US" b="1" dirty="0"/>
+              <a:t> </a:t>
+            </a:r>
+            <a:r>
+              <a:rPr lang="en-US" b="1" dirty="0" err="1"/>
+              <a:t>gelijktijdige</a:t>
+            </a:r>
+            <a:r>
+              <a:rPr lang="en-US" b="1" dirty="0"/>
+              <a:t> </a:t>
+            </a:r>
+            <a:r>
+              <a:rPr lang="en-US" b="1" dirty="0" err="1"/>
+              <a:t>sessies</a:t>
+            </a:r>
+            <a:r>
+              <a:rPr lang="en-US" b="1" dirty="0"/>
+              <a:t> </a:t>
+            </a:r>
+            <a:r>
+              <a:rPr lang="en-US" b="1" dirty="0" err="1"/>
+              <a:t>te</a:t>
+            </a:r>
+            <a:r>
+              <a:rPr lang="en-US" b="1" dirty="0"/>
+              <a:t> </a:t>
+            </a:r>
+            <a:r>
+              <a:rPr lang="en-US" b="1" dirty="0" err="1"/>
+              <a:t>kunnen</a:t>
+            </a:r>
+            <a:r>
+              <a:rPr lang="en-US" b="1" dirty="0"/>
+              <a:t> </a:t>
+            </a:r>
+            <a:r>
+              <a:rPr lang="en-US" b="1" dirty="0" err="1"/>
+              <a:t>laten</a:t>
+            </a:r>
+            <a:r>
+              <a:rPr lang="en-US" b="1" dirty="0"/>
+              <a:t> </a:t>
+            </a:r>
+            <a:r>
+              <a:rPr lang="en-US" b="1" dirty="0" err="1"/>
+              <a:t>verlopen</a:t>
+            </a:r>
+            <a:r>
+              <a:rPr lang="en-US" b="1" dirty="0"/>
+              <a:t>.</a:t>
+            </a:r>
           </a:p>
         </p:txBody>
       </p:sp>
@@ -1488,7 +1930,180 @@
               <a:buFontTx/>
               <a:buNone/>
             </a:pPr>
-            <a:endParaRPr lang="en-US" b="1" dirty="0"/>
+            <a:r>
+              <a:rPr lang="en-US" b="1" dirty="0"/>
+              <a:t>PC3 </a:t>
+            </a:r>
+            <a:r>
+              <a:rPr lang="en-US" b="1" dirty="0" err="1"/>
+              <a:t>heeft</a:t>
+            </a:r>
+            <a:r>
+              <a:rPr lang="en-US" b="1" dirty="0"/>
+              <a:t> </a:t>
+            </a:r>
+            <a:r>
+              <a:rPr lang="en-US" b="1" dirty="0" err="1"/>
+              <a:t>toegang</a:t>
+            </a:r>
+            <a:r>
+              <a:rPr lang="en-US" b="1" dirty="0"/>
+              <a:t> tot het internet met </a:t>
+            </a:r>
+            <a:r>
+              <a:rPr lang="en-US" b="1" dirty="0" err="1"/>
+              <a:t>behulp</a:t>
+            </a:r>
+            <a:r>
+              <a:rPr lang="en-US" b="1" dirty="0"/>
+              <a:t> van het </a:t>
+            </a:r>
+            <a:r>
+              <a:rPr lang="en-US" b="1" dirty="0" err="1"/>
+              <a:t>eerstvolgende</a:t>
+            </a:r>
+            <a:r>
+              <a:rPr lang="en-US" b="1" dirty="0"/>
+              <a:t> </a:t>
+            </a:r>
+            <a:r>
+              <a:rPr lang="en-US" b="1" dirty="0" err="1"/>
+              <a:t>vrije</a:t>
+            </a:r>
+            <a:r>
+              <a:rPr lang="en-US" b="1" dirty="0"/>
+              <a:t> address in de dynamic NAT pool.</a:t>
+            </a:r>
+          </a:p>
+          <a:p>
+            <a:pPr>
+              <a:buFontTx/>
+              <a:buNone/>
+            </a:pPr>
+            <a:r>
+              <a:rPr lang="en-US" b="1" dirty="0"/>
+              <a:t>De </a:t>
+            </a:r>
+            <a:r>
+              <a:rPr lang="en-US" b="1" dirty="0" err="1"/>
+              <a:t>andere</a:t>
+            </a:r>
+            <a:r>
+              <a:rPr lang="en-US" b="1" dirty="0"/>
+              <a:t> </a:t>
+            </a:r>
+            <a:r>
+              <a:rPr lang="en-US" b="1" dirty="0" err="1"/>
+              <a:t>addressen</a:t>
+            </a:r>
+            <a:r>
+              <a:rPr lang="en-US" b="1" dirty="0"/>
+              <a:t> in de pool </a:t>
+            </a:r>
+            <a:r>
+              <a:rPr lang="en-US" b="1" dirty="0" err="1"/>
+              <a:t>zijn</a:t>
+            </a:r>
+            <a:r>
+              <a:rPr lang="en-US" b="1" dirty="0"/>
+              <a:t> nog steeds </a:t>
+            </a:r>
+            <a:r>
+              <a:rPr lang="en-US" b="1" dirty="0" err="1"/>
+              <a:t>beschikaar</a:t>
+            </a:r>
+            <a:r>
+              <a:rPr lang="en-US" b="1" dirty="0"/>
+              <a:t>. Net </a:t>
+            </a:r>
+            <a:r>
+              <a:rPr lang="en-US" b="1" dirty="0" err="1"/>
+              <a:t>asl</a:t>
+            </a:r>
+            <a:r>
+              <a:rPr lang="en-US" b="1" dirty="0"/>
+              <a:t> </a:t>
+            </a:r>
+            <a:r>
+              <a:rPr lang="en-US" b="1" dirty="0" err="1"/>
+              <a:t>bij</a:t>
+            </a:r>
+            <a:r>
+              <a:rPr lang="en-US" b="1" dirty="0"/>
+              <a:t> static NAT </a:t>
+            </a:r>
+            <a:r>
+              <a:rPr lang="en-US" b="1" dirty="0" err="1"/>
+              <a:t>moeten</a:t>
+            </a:r>
+            <a:r>
+              <a:rPr lang="en-US" b="1" dirty="0"/>
+              <a:t> </a:t>
+            </a:r>
+            <a:r>
+              <a:rPr lang="en-US" b="1" dirty="0" err="1"/>
+              <a:t>er</a:t>
+            </a:r>
+            <a:r>
+              <a:rPr lang="en-US" b="1" dirty="0"/>
+              <a:t> </a:t>
+            </a:r>
+            <a:r>
+              <a:rPr lang="en-US" b="1" dirty="0" err="1"/>
+              <a:t>bij</a:t>
+            </a:r>
+            <a:r>
+              <a:rPr lang="en-US" b="1" dirty="0"/>
+              <a:t> dynamic NAT </a:t>
+            </a:r>
+            <a:r>
+              <a:rPr lang="en-US" b="1" dirty="0" err="1"/>
+              <a:t>voldoende</a:t>
+            </a:r>
+            <a:r>
+              <a:rPr lang="en-US" b="1" dirty="0"/>
+              <a:t> </a:t>
+            </a:r>
+            <a:r>
+              <a:rPr lang="en-US" b="1" dirty="0" err="1"/>
+              <a:t>addressen</a:t>
+            </a:r>
+            <a:r>
+              <a:rPr lang="en-US" b="1" dirty="0"/>
+              <a:t> </a:t>
+            </a:r>
+            <a:r>
+              <a:rPr lang="en-US" b="1" dirty="0" err="1"/>
+              <a:t>zijn</a:t>
+            </a:r>
+            <a:r>
+              <a:rPr lang="en-US" b="1" dirty="0"/>
+              <a:t> </a:t>
+            </a:r>
+            <a:r>
+              <a:rPr lang="en-US" b="1" dirty="0" err="1"/>
+              <a:t>voor</a:t>
+            </a:r>
+            <a:r>
+              <a:rPr lang="en-US" b="1" dirty="0"/>
+              <a:t> </a:t>
+            </a:r>
+            <a:r>
+              <a:rPr lang="en-US" b="1" dirty="0" err="1"/>
+              <a:t>gelijktijdige</a:t>
+            </a:r>
+            <a:r>
+              <a:rPr lang="en-US" b="1" dirty="0"/>
+              <a:t> </a:t>
+            </a:r>
+            <a:r>
+              <a:rPr lang="en-US" b="1" dirty="0" err="1"/>
+              <a:t>sessies</a:t>
+            </a:r>
+            <a:r>
+              <a:rPr lang="en-US" b="1" dirty="0"/>
+              <a:t>.</a:t>
+            </a:r>
           </a:p>
         </p:txBody>
       </p:sp>
@@ -1589,6 +2204,276 @@
               </a:rPr>
               <a:t>Port Address Translation NAT</a:t>
             </a:r>
+          </a:p>
+          <a:p>
+            <a:pPr>
+              <a:buFontTx/>
+              <a:buNone/>
+            </a:pPr>
+            <a:r>
+              <a:rPr lang="en-US" b="1" dirty="0" err="1">
+                <a:ea typeface="ＭＳ Ｐゴシック" pitchFamily="34" charset="-128"/>
+              </a:rPr>
+              <a:t>Dit</a:t>
+            </a:r>
+            <a:r>
+              <a:rPr lang="en-US" b="1" dirty="0">
+                <a:ea typeface="ＭＳ Ｐゴシック" pitchFamily="34" charset="-128"/>
+              </a:rPr>
+              <a:t> is </a:t>
+            </a:r>
+            <a:r>
+              <a:rPr lang="en-US" b="1" dirty="0" err="1">
+                <a:ea typeface="ＭＳ Ｐゴシック" pitchFamily="34" charset="-128"/>
+              </a:rPr>
+              <a:t>waarschijnlijk</a:t>
+            </a:r>
+            <a:r>
+              <a:rPr lang="en-US" b="1" dirty="0">
+                <a:ea typeface="ＭＳ Ｐゴシック" pitchFamily="34" charset="-128"/>
+              </a:rPr>
+              <a:t> </a:t>
+            </a:r>
+            <a:r>
+              <a:rPr lang="en-US" b="1" dirty="0" err="1">
+                <a:ea typeface="ＭＳ Ｐゴシック" pitchFamily="34" charset="-128"/>
+              </a:rPr>
+              <a:t>bij</a:t>
+            </a:r>
+            <a:r>
+              <a:rPr lang="en-US" b="1" dirty="0">
+                <a:ea typeface="ＭＳ Ｐゴシック" pitchFamily="34" charset="-128"/>
+              </a:rPr>
+              <a:t> </a:t>
+            </a:r>
+            <a:r>
+              <a:rPr lang="en-US" b="1" dirty="0" err="1">
+                <a:ea typeface="ＭＳ Ｐゴシック" pitchFamily="34" charset="-128"/>
+              </a:rPr>
+              <a:t>jullie</a:t>
+            </a:r>
+            <a:r>
+              <a:rPr lang="en-US" b="1" dirty="0">
+                <a:ea typeface="ＭＳ Ｐゴシック" pitchFamily="34" charset="-128"/>
+              </a:rPr>
+              <a:t> </a:t>
+            </a:r>
+            <a:r>
+              <a:rPr lang="en-US" b="1" dirty="0" err="1">
+                <a:ea typeface="ＭＳ Ｐゴシック" pitchFamily="34" charset="-128"/>
+              </a:rPr>
+              <a:t>thuis</a:t>
+            </a:r>
+            <a:r>
+              <a:rPr lang="en-US" b="1" dirty="0">
+                <a:ea typeface="ＭＳ Ｐゴシック" pitchFamily="34" charset="-128"/>
+              </a:rPr>
+              <a:t> </a:t>
+            </a:r>
+            <a:r>
+              <a:rPr lang="en-US" b="1" dirty="0" err="1">
+                <a:ea typeface="ＭＳ Ｐゴシック" pitchFamily="34" charset="-128"/>
+              </a:rPr>
+              <a:t>ook</a:t>
+            </a:r>
+            <a:r>
+              <a:rPr lang="en-US" b="1" dirty="0">
+                <a:ea typeface="ＭＳ Ｐゴシック" pitchFamily="34" charset="-128"/>
+              </a:rPr>
+              <a:t> zo.</a:t>
+            </a:r>
+          </a:p>
+          <a:p>
+            <a:pPr>
+              <a:buFontTx/>
+              <a:buNone/>
+            </a:pPr>
+            <a:r>
+              <a:rPr lang="en-US" b="1" dirty="0" err="1">
+                <a:ea typeface="ＭＳ Ｐゴシック" pitchFamily="34" charset="-128"/>
+              </a:rPr>
+              <a:t>Wanneer</a:t>
+            </a:r>
+            <a:r>
+              <a:rPr lang="en-US" b="1" dirty="0">
+                <a:ea typeface="ＭＳ Ｐゴシック" pitchFamily="34" charset="-128"/>
+              </a:rPr>
+              <a:t> 2 </a:t>
+            </a:r>
+            <a:r>
+              <a:rPr lang="en-US" b="1" dirty="0" err="1">
+                <a:ea typeface="ＭＳ Ｐゴシック" pitchFamily="34" charset="-128"/>
+              </a:rPr>
+              <a:t>verschillende</a:t>
+            </a:r>
+            <a:r>
+              <a:rPr lang="en-US" b="1" dirty="0">
+                <a:ea typeface="ＭＳ Ｐゴシック" pitchFamily="34" charset="-128"/>
+              </a:rPr>
+              <a:t> </a:t>
+            </a:r>
+            <a:r>
+              <a:rPr lang="en-US" b="1" dirty="0" err="1">
+                <a:ea typeface="ＭＳ Ｐゴシック" pitchFamily="34" charset="-128"/>
+              </a:rPr>
+              <a:t>apparaten</a:t>
+            </a:r>
+            <a:r>
+              <a:rPr lang="en-US" b="1" dirty="0">
+                <a:ea typeface="ＭＳ Ｐゴシック" pitchFamily="34" charset="-128"/>
+              </a:rPr>
+              <a:t> </a:t>
+            </a:r>
+            <a:r>
+              <a:rPr lang="en-US" b="1" dirty="0" err="1">
+                <a:ea typeface="ＭＳ Ｐゴシック" pitchFamily="34" charset="-128"/>
+              </a:rPr>
+              <a:t>zelfde</a:t>
+            </a:r>
+            <a:r>
+              <a:rPr lang="en-US" b="1" dirty="0">
+                <a:ea typeface="ＭＳ Ｐゴシック" pitchFamily="34" charset="-128"/>
+              </a:rPr>
+              <a:t> </a:t>
+            </a:r>
+            <a:r>
+              <a:rPr lang="en-US" b="1" dirty="0" err="1">
+                <a:ea typeface="ＭＳ Ｐゴシック" pitchFamily="34" charset="-128"/>
+              </a:rPr>
+              <a:t>poort</a:t>
+            </a:r>
+            <a:r>
+              <a:rPr lang="en-US" b="1" dirty="0">
+                <a:ea typeface="ＭＳ Ｐゴシック" pitchFamily="34" charset="-128"/>
+              </a:rPr>
+              <a:t> </a:t>
+            </a:r>
+            <a:r>
+              <a:rPr lang="en-US" b="1" dirty="0" err="1">
+                <a:ea typeface="ＭＳ Ｐゴシック" pitchFamily="34" charset="-128"/>
+              </a:rPr>
+              <a:t>willen</a:t>
+            </a:r>
+            <a:r>
+              <a:rPr lang="en-US" b="1" dirty="0">
+                <a:ea typeface="ＭＳ Ｐゴシック" pitchFamily="34" charset="-128"/>
+              </a:rPr>
+              <a:t> </a:t>
+            </a:r>
+            <a:r>
+              <a:rPr lang="en-US" b="1" dirty="0" err="1">
+                <a:ea typeface="ＭＳ Ｐゴシック" pitchFamily="34" charset="-128"/>
+              </a:rPr>
+              <a:t>bereiken</a:t>
+            </a:r>
+            <a:r>
+              <a:rPr lang="en-US" b="1" dirty="0">
+                <a:ea typeface="ＭＳ Ｐゴシック" pitchFamily="34" charset="-128"/>
+              </a:rPr>
+              <a:t> is </a:t>
+            </a:r>
+            <a:r>
+              <a:rPr lang="en-US" b="1" dirty="0" err="1">
+                <a:ea typeface="ＭＳ Ｐゴシック" pitchFamily="34" charset="-128"/>
+              </a:rPr>
+              <a:t>dit</a:t>
+            </a:r>
+            <a:r>
+              <a:rPr lang="en-US" b="1" dirty="0">
+                <a:ea typeface="ＭＳ Ｐゴシック" pitchFamily="34" charset="-128"/>
+              </a:rPr>
+              <a:t> </a:t>
+            </a:r>
+            <a:r>
+              <a:rPr lang="en-US" b="1" dirty="0" err="1">
+                <a:ea typeface="ＭＳ Ｐゴシック" pitchFamily="34" charset="-128"/>
+              </a:rPr>
+              <a:t>mogelijk</a:t>
+            </a:r>
+            <a:r>
+              <a:rPr lang="en-US" b="1" dirty="0">
+                <a:ea typeface="ＭＳ Ｐゴシック" pitchFamily="34" charset="-128"/>
+              </a:rPr>
+              <a:t> door </a:t>
+            </a:r>
+            <a:r>
+              <a:rPr lang="en-US" b="1" dirty="0" err="1">
+                <a:ea typeface="ＭＳ Ｐゴシック" pitchFamily="34" charset="-128"/>
+              </a:rPr>
+              <a:t>bij</a:t>
+            </a:r>
+            <a:r>
+              <a:rPr lang="en-US" b="1" dirty="0">
+                <a:ea typeface="ＭＳ Ｐゴシック" pitchFamily="34" charset="-128"/>
+              </a:rPr>
+              <a:t> apparat 2 de </a:t>
+            </a:r>
+            <a:r>
+              <a:rPr lang="en-US" b="1" dirty="0" err="1">
+                <a:ea typeface="ＭＳ Ｐゴシック" pitchFamily="34" charset="-128"/>
+              </a:rPr>
+              <a:t>volgende</a:t>
+            </a:r>
+            <a:r>
+              <a:rPr lang="en-US" b="1" dirty="0">
+                <a:ea typeface="ＭＳ Ｐゴシック" pitchFamily="34" charset="-128"/>
+              </a:rPr>
+              <a:t> </a:t>
+            </a:r>
+            <a:r>
+              <a:rPr lang="en-US" b="1" dirty="0" err="1">
+                <a:ea typeface="ＭＳ Ｐゴシック" pitchFamily="34" charset="-128"/>
+              </a:rPr>
+              <a:t>beschikbare</a:t>
+            </a:r>
+            <a:r>
+              <a:rPr lang="en-US" b="1" dirty="0">
+                <a:ea typeface="ＭＳ Ｐゴシック" pitchFamily="34" charset="-128"/>
+              </a:rPr>
+              <a:t> </a:t>
+            </a:r>
+            <a:r>
+              <a:rPr lang="en-US" b="1" dirty="0" err="1">
+                <a:ea typeface="ＭＳ Ｐゴシック" pitchFamily="34" charset="-128"/>
+              </a:rPr>
+              <a:t>poort</a:t>
+            </a:r>
+            <a:r>
+              <a:rPr lang="en-US" b="1" dirty="0">
+                <a:ea typeface="ＭＳ Ｐゴシック" pitchFamily="34" charset="-128"/>
+              </a:rPr>
+              <a:t> </a:t>
+            </a:r>
+            <a:r>
+              <a:rPr lang="en-US" b="1" dirty="0" err="1">
+                <a:ea typeface="ＭＳ Ｐゴシック" pitchFamily="34" charset="-128"/>
+              </a:rPr>
+              <a:t>te</a:t>
+            </a:r>
+            <a:r>
+              <a:rPr lang="en-US" b="1" dirty="0">
+                <a:ea typeface="ＭＳ Ｐゴシック" pitchFamily="34" charset="-128"/>
+              </a:rPr>
+              <a:t> </a:t>
+            </a:r>
+            <a:r>
+              <a:rPr lang="en-US" b="1" dirty="0" err="1">
+                <a:ea typeface="ＭＳ Ｐゴシック" pitchFamily="34" charset="-128"/>
+              </a:rPr>
+              <a:t>gebruiken</a:t>
+            </a:r>
+            <a:r>
+              <a:rPr lang="en-US" b="1" dirty="0">
+                <a:ea typeface="ＭＳ Ｐゴシック" pitchFamily="34" charset="-128"/>
+              </a:rPr>
+              <a:t>.</a:t>
+            </a:r>
+          </a:p>
+          <a:p>
+            <a:pPr>
+              <a:buFontTx/>
+              <a:buNone/>
+            </a:pPr>
             <a:endParaRPr lang="en-US" b="1" dirty="0"/>
           </a:p>
         </p:txBody>
@@ -1690,13 +2575,186 @@
               </a:rPr>
               <a:t>Comparing NAT and PAT</a:t>
             </a:r>
-            <a:endParaRPr lang="en-US" b="1" dirty="0"/>
           </a:p>
           <a:p>
             <a:pPr>
               <a:buFontTx/>
               <a:buNone/>
             </a:pPr>
+            <a:r>
+              <a:rPr lang="en-US" b="1" dirty="0" err="1">
+                <a:ea typeface="ＭＳ Ｐゴシック" pitchFamily="34" charset="-128"/>
+              </a:rPr>
+              <a:t>Bij</a:t>
+            </a:r>
+            <a:r>
+              <a:rPr lang="en-US" b="1" dirty="0">
+                <a:ea typeface="ＭＳ Ｐゴシック" pitchFamily="34" charset="-128"/>
+              </a:rPr>
+              <a:t> ICMP </a:t>
+            </a:r>
+            <a:r>
+              <a:rPr lang="en-US" b="1" dirty="0" err="1">
+                <a:ea typeface="ＭＳ Ｐゴシック" pitchFamily="34" charset="-128"/>
+              </a:rPr>
+              <a:t>krijgen</a:t>
+            </a:r>
+            <a:r>
+              <a:rPr lang="en-US" b="1" dirty="0">
+                <a:ea typeface="ＭＳ Ｐゴシック" pitchFamily="34" charset="-128"/>
+              </a:rPr>
+              <a:t> de query messages </a:t>
+            </a:r>
+            <a:r>
+              <a:rPr lang="en-US" b="1" dirty="0" err="1">
+                <a:ea typeface="ＭＳ Ｐゴシック" pitchFamily="34" charset="-128"/>
+              </a:rPr>
+              <a:t>een</a:t>
+            </a:r>
+            <a:r>
+              <a:rPr lang="en-US" b="1" dirty="0">
+                <a:ea typeface="ＭＳ Ｐゴシック" pitchFamily="34" charset="-128"/>
+              </a:rPr>
+              <a:t> </a:t>
+            </a:r>
+            <a:r>
+              <a:rPr lang="en-US" b="1" dirty="0" err="1">
+                <a:ea typeface="ＭＳ Ｐゴシック" pitchFamily="34" charset="-128"/>
+              </a:rPr>
+              <a:t>uniek</a:t>
+            </a:r>
+            <a:r>
+              <a:rPr lang="en-US" b="1" dirty="0">
+                <a:ea typeface="ＭＳ Ｐゴシック" pitchFamily="34" charset="-128"/>
+              </a:rPr>
+              <a:t> query id, ICMP </a:t>
+            </a:r>
+            <a:r>
+              <a:rPr lang="en-US" b="1" dirty="0" err="1">
+                <a:ea typeface="ＭＳ Ｐゴシック" pitchFamily="34" charset="-128"/>
+              </a:rPr>
+              <a:t>gebruikt</a:t>
+            </a:r>
+            <a:r>
+              <a:rPr lang="en-US" b="1" dirty="0">
+                <a:ea typeface="ＭＳ Ｐゴシック" pitchFamily="34" charset="-128"/>
+              </a:rPr>
+              <a:t> </a:t>
+            </a:r>
+            <a:r>
+              <a:rPr lang="en-US" b="1" dirty="0" err="1">
+                <a:ea typeface="ＭＳ Ｐゴシック" pitchFamily="34" charset="-128"/>
+              </a:rPr>
+              <a:t>dit</a:t>
+            </a:r>
+            <a:r>
+              <a:rPr lang="en-US" b="1" dirty="0">
+                <a:ea typeface="ＭＳ Ｐゴシック" pitchFamily="34" charset="-128"/>
+              </a:rPr>
+              <a:t> query id om echo request met </a:t>
+            </a:r>
+            <a:r>
+              <a:rPr lang="en-US" b="1" dirty="0" err="1">
+                <a:ea typeface="ＭＳ Ｐゴシック" pitchFamily="34" charset="-128"/>
+              </a:rPr>
+              <a:t>bijhoren,de</a:t>
+            </a:r>
+            <a:r>
+              <a:rPr lang="en-US" b="1" dirty="0">
+                <a:ea typeface="ＭＳ Ｐゴシック" pitchFamily="34" charset="-128"/>
+              </a:rPr>
+              <a:t> reply </a:t>
+            </a:r>
+            <a:r>
+              <a:rPr lang="en-US" b="1" dirty="0" err="1">
+                <a:ea typeface="ＭＳ Ｐゴシック" pitchFamily="34" charset="-128"/>
+              </a:rPr>
+              <a:t>te</a:t>
+            </a:r>
+            <a:r>
+              <a:rPr lang="en-US" b="1" dirty="0">
+                <a:ea typeface="ＭＳ Ｐゴシック" pitchFamily="34" charset="-128"/>
+              </a:rPr>
+              <a:t> </a:t>
+            </a:r>
+            <a:r>
+              <a:rPr lang="en-US" b="1" dirty="0" err="1">
+                <a:ea typeface="ＭＳ Ｐゴシック" pitchFamily="34" charset="-128"/>
+              </a:rPr>
+              <a:t>identificeren</a:t>
+            </a:r>
+            <a:r>
+              <a:rPr lang="en-US" b="1" dirty="0">
+                <a:ea typeface="ＭＳ Ｐゴシック" pitchFamily="34" charset="-128"/>
+              </a:rPr>
+              <a:t>.</a:t>
+            </a:r>
+          </a:p>
+          <a:p>
+            <a:pPr>
+              <a:buFontTx/>
+              <a:buNone/>
+            </a:pPr>
+            <a:r>
+              <a:rPr lang="en-US" b="1" dirty="0">
+                <a:ea typeface="ＭＳ Ｐゴシック" pitchFamily="34" charset="-128"/>
+              </a:rPr>
+              <a:t>PAT </a:t>
+            </a:r>
+            <a:r>
+              <a:rPr lang="en-US" b="1" dirty="0" err="1">
+                <a:ea typeface="ＭＳ Ｐゴシック" pitchFamily="34" charset="-128"/>
+              </a:rPr>
+              <a:t>gebruikt</a:t>
+            </a:r>
+            <a:r>
+              <a:rPr lang="en-US" b="1" dirty="0">
+                <a:ea typeface="ＭＳ Ｐゴシック" pitchFamily="34" charset="-128"/>
+              </a:rPr>
+              <a:t> </a:t>
+            </a:r>
+            <a:r>
+              <a:rPr lang="en-US" b="1" dirty="0" err="1">
+                <a:ea typeface="ＭＳ Ｐゴシック" pitchFamily="34" charset="-128"/>
+              </a:rPr>
+              <a:t>dit</a:t>
+            </a:r>
+            <a:r>
+              <a:rPr lang="en-US" b="1" dirty="0">
+                <a:ea typeface="ＭＳ Ｐゴシック" pitchFamily="34" charset="-128"/>
+              </a:rPr>
+              <a:t> </a:t>
+            </a:r>
+            <a:r>
+              <a:rPr lang="en-US" b="1" dirty="0" err="1">
+                <a:ea typeface="ＭＳ Ｐゴシック" pitchFamily="34" charset="-128"/>
+              </a:rPr>
+              <a:t>auery</a:t>
+            </a:r>
+            <a:r>
+              <a:rPr lang="en-US" b="1" dirty="0">
+                <a:ea typeface="ＭＳ Ｐゴシック" pitchFamily="34" charset="-128"/>
+              </a:rPr>
+              <a:t> ID in de </a:t>
+            </a:r>
+            <a:r>
+              <a:rPr lang="en-US" b="1" dirty="0" err="1">
+                <a:ea typeface="ＭＳ Ｐゴシック" pitchFamily="34" charset="-128"/>
+              </a:rPr>
+              <a:t>plaats</a:t>
+            </a:r>
+            <a:r>
+              <a:rPr lang="en-US" b="1" dirty="0">
+                <a:ea typeface="ＭＳ Ｐゴシック" pitchFamily="34" charset="-128"/>
+              </a:rPr>
+              <a:t> van het port </a:t>
+            </a:r>
+            <a:r>
+              <a:rPr lang="en-US" b="1" dirty="0" err="1">
+                <a:ea typeface="ＭＳ Ｐゴシック" pitchFamily="34" charset="-128"/>
+              </a:rPr>
+              <a:t>nummer</a:t>
+            </a:r>
             <a:endParaRPr lang="en-US" b="1" dirty="0"/>
           </a:p>
         </p:txBody>
@@ -1805,6 +2863,379 @@
               <a:buFontTx/>
               <a:buNone/>
             </a:pPr>
+            <a:r>
+              <a:rPr lang="en-US" b="1" dirty="0"/>
+              <a:t>1: </a:t>
+            </a:r>
+            <a:r>
+              <a:rPr lang="en-US" b="1" dirty="0" err="1"/>
+              <a:t>dit</a:t>
+            </a:r>
+            <a:r>
+              <a:rPr lang="en-US" b="1" dirty="0"/>
+              <a:t> </a:t>
+            </a:r>
+            <a:r>
+              <a:rPr lang="en-US" b="1" dirty="0" err="1"/>
+              <a:t>wil</a:t>
+            </a:r>
+            <a:r>
+              <a:rPr lang="en-US" b="1" dirty="0"/>
+              <a:t> </a:t>
+            </a:r>
+            <a:r>
+              <a:rPr lang="en-US" b="1" dirty="0" err="1"/>
+              <a:t>zeggen</a:t>
+            </a:r>
+            <a:r>
+              <a:rPr lang="en-US" b="1" dirty="0"/>
+              <a:t> </a:t>
+            </a:r>
+            <a:r>
+              <a:rPr lang="en-US" b="1" dirty="0" err="1"/>
+              <a:t>dat</a:t>
+            </a:r>
+            <a:r>
+              <a:rPr lang="en-US" b="1" dirty="0"/>
+              <a:t> interne </a:t>
+            </a:r>
+            <a:r>
+              <a:rPr lang="en-US" b="1" dirty="0" err="1"/>
+              <a:t>netwerken</a:t>
+            </a:r>
+            <a:r>
+              <a:rPr lang="en-US" b="1" dirty="0"/>
+              <a:t> </a:t>
+            </a:r>
+            <a:r>
+              <a:rPr lang="en-US" b="1" dirty="0" err="1"/>
+              <a:t>privé</a:t>
+            </a:r>
+            <a:r>
+              <a:rPr lang="en-US" b="1" dirty="0"/>
+              <a:t> </a:t>
+            </a:r>
+            <a:r>
+              <a:rPr lang="en-US" b="1" dirty="0" err="1"/>
+              <a:t>blijven</a:t>
+            </a:r>
+            <a:r>
+              <a:rPr lang="en-US" b="1" dirty="0"/>
+              <a:t> in </a:t>
+            </a:r>
+            <a:r>
+              <a:rPr lang="en-US" b="1" dirty="0" err="1"/>
+              <a:t>perspectief</a:t>
+            </a:r>
+            <a:r>
+              <a:rPr lang="en-US" b="1" dirty="0"/>
+              <a:t> van </a:t>
+            </a:r>
+            <a:r>
+              <a:rPr lang="en-US" b="1" dirty="0" err="1"/>
+              <a:t>een</a:t>
+            </a:r>
+            <a:r>
+              <a:rPr lang="en-US" b="1" dirty="0"/>
+              <a:t> extern network.</a:t>
+            </a:r>
+          </a:p>
+          <a:p>
+            <a:pPr>
+              <a:buFontTx/>
+              <a:buNone/>
+            </a:pPr>
+            <a:r>
+              <a:rPr lang="en-US" b="1" dirty="0"/>
+              <a:t>2: </a:t>
+            </a:r>
+            <a:r>
+              <a:rPr lang="en-US" b="1" dirty="0" err="1"/>
+              <a:t>meerdere</a:t>
+            </a:r>
+            <a:r>
+              <a:rPr lang="en-US" b="1" dirty="0"/>
+              <a:t> pools, backup pools </a:t>
+            </a:r>
+            <a:r>
+              <a:rPr lang="en-US" b="1" dirty="0" err="1"/>
+              <a:t>en</a:t>
+            </a:r>
+            <a:r>
+              <a:rPr lang="en-US" b="1" dirty="0"/>
+              <a:t> load-balancing pools </a:t>
+            </a:r>
+            <a:r>
+              <a:rPr lang="en-US" b="1" dirty="0" err="1"/>
+              <a:t>kunnen</a:t>
+            </a:r>
+            <a:r>
+              <a:rPr lang="en-US" b="1" dirty="0"/>
+              <a:t> </a:t>
+            </a:r>
+            <a:r>
+              <a:rPr lang="en-US" b="1" dirty="0" err="1"/>
+              <a:t>geimplementeerd</a:t>
+            </a:r>
+            <a:r>
+              <a:rPr lang="en-US" b="1" dirty="0"/>
+              <a:t> </a:t>
+            </a:r>
+            <a:r>
+              <a:rPr lang="en-US" b="1" dirty="0" err="1"/>
+              <a:t>worden</a:t>
+            </a:r>
+            <a:r>
+              <a:rPr lang="en-US" b="1" dirty="0"/>
+              <a:t> </a:t>
+            </a:r>
+            <a:r>
+              <a:rPr lang="en-US" b="1" dirty="0" err="1"/>
+              <a:t>voor</a:t>
+            </a:r>
+            <a:r>
+              <a:rPr lang="en-US" b="1" dirty="0"/>
+              <a:t> </a:t>
+            </a:r>
+            <a:r>
+              <a:rPr lang="en-US" b="1" dirty="0" err="1"/>
+              <a:t>een</a:t>
+            </a:r>
+            <a:r>
+              <a:rPr lang="en-US" b="1" dirty="0"/>
+              <a:t> </a:t>
+            </a:r>
+            <a:r>
+              <a:rPr lang="en-US" b="1" dirty="0" err="1"/>
+              <a:t>meer</a:t>
+            </a:r>
+            <a:r>
+              <a:rPr lang="en-US" b="1" dirty="0"/>
+              <a:t> </a:t>
+            </a:r>
+            <a:r>
+              <a:rPr lang="en-US" b="1" dirty="0" err="1"/>
+              <a:t>bedrijfzekere</a:t>
+            </a:r>
+            <a:r>
+              <a:rPr lang="en-US" b="1" dirty="0"/>
+              <a:t> </a:t>
+            </a:r>
+            <a:r>
+              <a:rPr lang="en-US" b="1" dirty="0" err="1"/>
+              <a:t>connectie</a:t>
+            </a:r>
+            <a:r>
+              <a:rPr lang="en-US" b="1" dirty="0"/>
+              <a:t>.</a:t>
+            </a:r>
+          </a:p>
+          <a:p>
+            <a:pPr>
+              <a:buFontTx/>
+              <a:buNone/>
+            </a:pPr>
+            <a:r>
+              <a:rPr lang="en-US" b="1" dirty="0"/>
+              <a:t>3: </a:t>
+            </a:r>
+            <a:r>
+              <a:rPr lang="en-US" b="1" dirty="0" err="1"/>
+              <a:t>wanneer</a:t>
+            </a:r>
+            <a:r>
+              <a:rPr lang="en-US" b="1" dirty="0"/>
+              <a:t> </a:t>
+            </a:r>
+            <a:r>
+              <a:rPr lang="en-US" b="1" dirty="0" err="1"/>
+              <a:t>een</a:t>
+            </a:r>
+            <a:r>
+              <a:rPr lang="en-US" b="1" dirty="0"/>
+              <a:t> network </a:t>
+            </a:r>
+            <a:r>
+              <a:rPr lang="en-US" b="1" dirty="0" err="1"/>
+              <a:t>geen</a:t>
+            </a:r>
+            <a:r>
+              <a:rPr lang="en-US" b="1" dirty="0"/>
+              <a:t> </a:t>
+            </a:r>
+            <a:r>
+              <a:rPr lang="en-US" b="1" dirty="0" err="1"/>
+              <a:t>gebruik</a:t>
+            </a:r>
+            <a:r>
+              <a:rPr lang="en-US" b="1" dirty="0"/>
+              <a:t> </a:t>
+            </a:r>
+            <a:r>
+              <a:rPr lang="en-US" b="1" dirty="0" err="1"/>
+              <a:t>maakt</a:t>
+            </a:r>
+            <a:r>
+              <a:rPr lang="en-US" b="1" dirty="0"/>
+              <a:t> van NAT is het </a:t>
+            </a:r>
+            <a:r>
+              <a:rPr lang="en-US" b="1" dirty="0" err="1"/>
+              <a:t>veranderen</a:t>
+            </a:r>
+            <a:r>
+              <a:rPr lang="en-US" b="1" dirty="0"/>
+              <a:t> van het public IPv4 address </a:t>
+            </a:r>
+            <a:r>
+              <a:rPr lang="en-US" b="1" dirty="0" err="1"/>
+              <a:t>een</a:t>
+            </a:r>
+            <a:r>
+              <a:rPr lang="en-US" b="1" dirty="0"/>
+              <a:t> </a:t>
+            </a:r>
+            <a:r>
+              <a:rPr lang="en-US" b="1" dirty="0" err="1"/>
+              <a:t>kostelijke</a:t>
+            </a:r>
+            <a:r>
+              <a:rPr lang="en-US" b="1" dirty="0"/>
+              <a:t> </a:t>
+            </a:r>
+            <a:r>
+              <a:rPr lang="en-US" b="1" dirty="0" err="1"/>
+              <a:t>bedoeling</a:t>
+            </a:r>
+            <a:r>
+              <a:rPr lang="en-US" b="1" dirty="0"/>
+              <a:t>. Want </a:t>
+            </a:r>
+            <a:r>
+              <a:rPr lang="en-US" b="1" dirty="0" err="1"/>
+              <a:t>dan</a:t>
+            </a:r>
+            <a:r>
+              <a:rPr lang="en-US" b="1" dirty="0"/>
+              <a:t> </a:t>
+            </a:r>
+            <a:r>
+              <a:rPr lang="en-US" b="1" dirty="0" err="1"/>
+              <a:t>moet</a:t>
+            </a:r>
+            <a:r>
+              <a:rPr lang="en-US" b="1" dirty="0"/>
+              <a:t> men </a:t>
+            </a:r>
+            <a:r>
+              <a:rPr lang="en-US" b="1" dirty="0" err="1"/>
+              <a:t>alle</a:t>
+            </a:r>
+            <a:r>
+              <a:rPr lang="en-US" b="1" dirty="0"/>
+              <a:t> interne </a:t>
+            </a:r>
+            <a:r>
+              <a:rPr lang="en-US" b="1" dirty="0" err="1"/>
+              <a:t>apparaten</a:t>
+            </a:r>
+            <a:r>
+              <a:rPr lang="en-US" b="1" dirty="0"/>
+              <a:t> </a:t>
+            </a:r>
+            <a:r>
+              <a:rPr lang="en-US" b="1" dirty="0" err="1"/>
+              <a:t>heradresseren</a:t>
+            </a:r>
+            <a:endParaRPr lang="en-US" b="1" dirty="0"/>
+          </a:p>
+          <a:p>
+            <a:pPr>
+              <a:buFontTx/>
+              <a:buNone/>
+            </a:pPr>
+            <a:r>
+              <a:rPr lang="en-US" b="1" dirty="0"/>
+              <a:t>4: </a:t>
+            </a:r>
+            <a:r>
+              <a:rPr lang="en-US" b="1" dirty="0" err="1"/>
+              <a:t>omdat</a:t>
+            </a:r>
+            <a:r>
+              <a:rPr lang="en-US" b="1" dirty="0"/>
+              <a:t> de interne </a:t>
+            </a:r>
+            <a:r>
+              <a:rPr lang="en-US" b="1" dirty="0" err="1"/>
+              <a:t>adressen</a:t>
+            </a:r>
+            <a:r>
+              <a:rPr lang="en-US" b="1" dirty="0"/>
+              <a:t> </a:t>
+            </a:r>
+            <a:r>
+              <a:rPr lang="en-US" b="1" dirty="0" err="1"/>
+              <a:t>en</a:t>
+            </a:r>
+            <a:r>
+              <a:rPr lang="en-US" b="1" dirty="0"/>
+              <a:t> </a:t>
+            </a:r>
+            <a:r>
+              <a:rPr lang="en-US" b="1" dirty="0" err="1"/>
+              <a:t>topologie</a:t>
+            </a:r>
+            <a:r>
+              <a:rPr lang="en-US" b="1" dirty="0"/>
+              <a:t>  </a:t>
+            </a:r>
+            <a:r>
+              <a:rPr lang="en-US" b="1" dirty="0" err="1"/>
+              <a:t>privé</a:t>
+            </a:r>
+            <a:r>
+              <a:rPr lang="en-US" b="1" dirty="0"/>
+              <a:t> </a:t>
+            </a:r>
+            <a:r>
+              <a:rPr lang="en-US" b="1" dirty="0" err="1"/>
+              <a:t>blijft</a:t>
+            </a:r>
+            <a:r>
+              <a:rPr lang="en-US" b="1" dirty="0"/>
+              <a:t>. Maar NAT </a:t>
+            </a:r>
+            <a:r>
+              <a:rPr lang="en-US" b="1" dirty="0" err="1"/>
+              <a:t>vervangt</a:t>
+            </a:r>
+            <a:r>
+              <a:rPr lang="en-US" b="1" dirty="0"/>
+              <a:t> </a:t>
+            </a:r>
+            <a:r>
+              <a:rPr lang="en-US" b="1" dirty="0" err="1"/>
+              <a:t>zeker</a:t>
+            </a:r>
+            <a:r>
+              <a:rPr lang="en-US" b="1" dirty="0"/>
+              <a:t> </a:t>
+            </a:r>
+            <a:r>
+              <a:rPr lang="en-US" b="1" dirty="0" err="1"/>
+              <a:t>geen</a:t>
+            </a:r>
+            <a:r>
+              <a:rPr lang="en-US" b="1" dirty="0"/>
+              <a:t> firewall.</a:t>
+            </a:r>
+          </a:p>
+          <a:p>
+            <a:pPr>
+              <a:buFontTx/>
+              <a:buNone/>
+            </a:pPr>
             <a:endParaRPr lang="en-US" b="1" dirty="0"/>
           </a:p>
         </p:txBody>
@@ -1913,7 +3344,697 @@
               <a:buFontTx/>
               <a:buNone/>
             </a:pPr>
+            <a:r>
+              <a:rPr lang="en-US" b="1" dirty="0"/>
+              <a:t>1: de router </a:t>
+            </a:r>
+            <a:r>
+              <a:rPr lang="en-US" b="1" dirty="0" err="1"/>
+              <a:t>moet</a:t>
+            </a:r>
+            <a:r>
+              <a:rPr lang="en-US" b="1" dirty="0"/>
+              <a:t> elk packet </a:t>
+            </a:r>
+            <a:r>
+              <a:rPr lang="en-US" b="1" dirty="0" err="1"/>
+              <a:t>controleren</a:t>
+            </a:r>
+            <a:r>
+              <a:rPr lang="en-US" b="1" dirty="0"/>
+              <a:t> of het </a:t>
+            </a:r>
+            <a:r>
+              <a:rPr lang="en-US" b="1" dirty="0" err="1"/>
+              <a:t>omgezet</a:t>
+            </a:r>
+            <a:r>
+              <a:rPr lang="en-US" b="1" dirty="0"/>
+              <a:t> </a:t>
+            </a:r>
+            <a:r>
+              <a:rPr lang="en-US" b="1" dirty="0" err="1"/>
+              <a:t>moet</a:t>
+            </a:r>
+            <a:r>
+              <a:rPr lang="en-US" b="1" dirty="0"/>
+              <a:t> </a:t>
+            </a:r>
+            <a:r>
+              <a:rPr lang="en-US" b="1" dirty="0" err="1"/>
+              <a:t>worden</a:t>
+            </a:r>
+            <a:r>
+              <a:rPr lang="en-US" b="1" dirty="0"/>
+              <a:t>, </a:t>
+            </a:r>
+            <a:r>
+              <a:rPr lang="en-US" b="1" dirty="0" err="1"/>
+              <a:t>wanneer</a:t>
+            </a:r>
+            <a:r>
+              <a:rPr lang="en-US" b="1" dirty="0"/>
+              <a:t> </a:t>
+            </a:r>
+            <a:r>
+              <a:rPr lang="en-US" b="1" dirty="0" err="1"/>
+              <a:t>dit</a:t>
+            </a:r>
+            <a:r>
+              <a:rPr lang="en-US" b="1" dirty="0"/>
+              <a:t> </a:t>
+            </a:r>
+            <a:r>
+              <a:rPr lang="en-US" b="1" dirty="0" err="1"/>
+              <a:t>omgezet</a:t>
+            </a:r>
+            <a:r>
+              <a:rPr lang="en-US" b="1" dirty="0"/>
+              <a:t> </a:t>
+            </a:r>
+            <a:r>
+              <a:rPr lang="en-US" b="1" dirty="0" err="1"/>
+              <a:t>moet</a:t>
+            </a:r>
+            <a:r>
+              <a:rPr lang="en-US" b="1" dirty="0"/>
+              <a:t> </a:t>
+            </a:r>
+            <a:r>
+              <a:rPr lang="en-US" b="1" dirty="0" err="1"/>
+              <a:t>worden</a:t>
+            </a:r>
+            <a:r>
+              <a:rPr lang="en-US" b="1" dirty="0"/>
+              <a:t> </a:t>
+            </a:r>
+            <a:r>
+              <a:rPr lang="en-US" b="1" dirty="0" err="1"/>
+              <a:t>neemt</a:t>
+            </a:r>
+            <a:r>
+              <a:rPr lang="en-US" b="1" dirty="0"/>
+              <a:t> </a:t>
+            </a:r>
+            <a:r>
+              <a:rPr lang="en-US" b="1" dirty="0" err="1"/>
+              <a:t>dit</a:t>
+            </a:r>
+            <a:r>
+              <a:rPr lang="en-US" b="1" dirty="0"/>
+              <a:t> </a:t>
+            </a:r>
+            <a:r>
+              <a:rPr lang="en-US" b="1" dirty="0" err="1"/>
+              <a:t>ook</a:t>
+            </a:r>
+            <a:r>
+              <a:rPr lang="en-US" b="1" dirty="0"/>
+              <a:t> </a:t>
+            </a:r>
+            <a:r>
+              <a:rPr lang="en-US" b="1" dirty="0" err="1"/>
+              <a:t>tijd</a:t>
+            </a:r>
+            <a:r>
+              <a:rPr lang="en-US" b="1" dirty="0"/>
+              <a:t> in </a:t>
+            </a:r>
+            <a:r>
+              <a:rPr lang="en-US" b="1" dirty="0" err="1"/>
+              <a:t>beslag</a:t>
+            </a:r>
+            <a:r>
+              <a:rPr lang="en-US" b="1" dirty="0"/>
+              <a:t> om </a:t>
+            </a:r>
+            <a:r>
+              <a:rPr lang="en-US" b="1" dirty="0" err="1"/>
+              <a:t>hiervan</a:t>
+            </a:r>
+            <a:r>
+              <a:rPr lang="en-US" b="1" dirty="0"/>
+              <a:t> </a:t>
+            </a:r>
+            <a:r>
+              <a:rPr lang="en-US" b="1" dirty="0" err="1"/>
+              <a:t>een</a:t>
+            </a:r>
+            <a:r>
+              <a:rPr lang="en-US" b="1" dirty="0"/>
+              <a:t> packet met header </a:t>
+            </a:r>
+            <a:r>
+              <a:rPr lang="en-US" b="1" dirty="0" err="1"/>
+              <a:t>en</a:t>
+            </a:r>
+            <a:r>
+              <a:rPr lang="en-US" b="1" dirty="0"/>
+              <a:t> </a:t>
+            </a:r>
+            <a:r>
+              <a:rPr lang="en-US" b="1" dirty="0" err="1"/>
+              <a:t>eventuele</a:t>
+            </a:r>
+            <a:r>
+              <a:rPr lang="en-US" b="1" dirty="0"/>
+              <a:t> checksum (</a:t>
+            </a:r>
+            <a:r>
+              <a:rPr lang="en-US" b="1" dirty="0" err="1"/>
+              <a:t>alleen</a:t>
+            </a:r>
+            <a:r>
+              <a:rPr lang="en-US" b="1" dirty="0"/>
+              <a:t> </a:t>
+            </a:r>
+            <a:r>
+              <a:rPr lang="en-US" b="1" dirty="0" err="1"/>
+              <a:t>bij</a:t>
+            </a:r>
+            <a:r>
+              <a:rPr lang="en-US" b="1" dirty="0"/>
+              <a:t> </a:t>
+            </a:r>
+            <a:r>
+              <a:rPr lang="en-US" b="1" dirty="0" err="1"/>
+              <a:t>tcp</a:t>
+            </a:r>
+            <a:r>
+              <a:rPr lang="en-US" b="1" dirty="0"/>
+              <a:t>, </a:t>
+            </a:r>
+            <a:r>
+              <a:rPr lang="en-US" b="1" dirty="0" err="1"/>
+              <a:t>niet</a:t>
+            </a:r>
+            <a:r>
+              <a:rPr lang="en-US" b="1" dirty="0"/>
+              <a:t> </a:t>
+            </a:r>
+            <a:r>
+              <a:rPr lang="en-US" b="1" dirty="0" err="1"/>
+              <a:t>bij</a:t>
+            </a:r>
+            <a:r>
+              <a:rPr lang="en-US" b="1" dirty="0"/>
+              <a:t> </a:t>
+            </a:r>
+            <a:r>
+              <a:rPr lang="en-US" b="1" dirty="0" err="1"/>
+              <a:t>udp</a:t>
+            </a:r>
+            <a:r>
+              <a:rPr lang="en-US" b="1" dirty="0"/>
+              <a:t>) </a:t>
+            </a:r>
+            <a:r>
+              <a:rPr lang="en-US" b="1" dirty="0" err="1"/>
+              <a:t>te</a:t>
+            </a:r>
+            <a:r>
+              <a:rPr lang="en-US" b="1" dirty="0"/>
+              <a:t> </a:t>
+            </a:r>
+            <a:r>
+              <a:rPr lang="en-US" b="1" dirty="0" err="1"/>
+              <a:t>maken</a:t>
+            </a:r>
             <a:endParaRPr lang="en-US" b="1" dirty="0"/>
+          </a:p>
+          <a:p>
+            <a:pPr>
+              <a:buFontTx/>
+              <a:buNone/>
+            </a:pPr>
+            <a:r>
+              <a:rPr lang="en-US" b="1" dirty="0"/>
+              <a:t>2: end-to-end </a:t>
+            </a:r>
+            <a:r>
+              <a:rPr lang="en-US" b="1" dirty="0" err="1"/>
+              <a:t>addressering</a:t>
+            </a:r>
+            <a:r>
+              <a:rPr lang="en-US" b="1" dirty="0"/>
+              <a:t> is </a:t>
+            </a:r>
+            <a:r>
+              <a:rPr lang="en-US" b="1" dirty="0" err="1"/>
+              <a:t>hier</a:t>
+            </a:r>
+            <a:r>
+              <a:rPr lang="en-US" b="1" dirty="0"/>
+              <a:t> </a:t>
+            </a:r>
+            <a:r>
+              <a:rPr lang="en-US" b="1" dirty="0" err="1"/>
+              <a:t>niet</a:t>
+            </a:r>
+            <a:r>
+              <a:rPr lang="en-US" b="1" dirty="0"/>
+              <a:t> van </a:t>
+            </a:r>
+            <a:r>
+              <a:rPr lang="en-US" b="1" dirty="0" err="1"/>
+              <a:t>toepassing</a:t>
+            </a:r>
+            <a:r>
+              <a:rPr lang="en-US" b="1" dirty="0"/>
+              <a:t>.  </a:t>
+            </a:r>
+            <a:r>
+              <a:rPr lang="en-US" b="1" dirty="0" err="1"/>
+              <a:t>Veel</a:t>
+            </a:r>
+            <a:r>
+              <a:rPr lang="en-US" b="1" dirty="0"/>
+              <a:t> internet </a:t>
+            </a:r>
+            <a:r>
+              <a:rPr lang="en-US" b="1" dirty="0" err="1"/>
+              <a:t>protocollen</a:t>
+            </a:r>
+            <a:r>
+              <a:rPr lang="en-US" b="1" dirty="0"/>
+              <a:t> </a:t>
+            </a:r>
+            <a:r>
+              <a:rPr lang="en-US" b="1" dirty="0" err="1"/>
+              <a:t>en</a:t>
+            </a:r>
+            <a:r>
+              <a:rPr lang="en-US" b="1" dirty="0"/>
+              <a:t> </a:t>
+            </a:r>
+            <a:r>
+              <a:rPr lang="en-US" b="1" dirty="0" err="1"/>
+              <a:t>applicaties</a:t>
+            </a:r>
+            <a:r>
+              <a:rPr lang="en-US" b="1" dirty="0"/>
+              <a:t> </a:t>
+            </a:r>
+            <a:r>
+              <a:rPr lang="en-US" b="1" dirty="0" err="1"/>
+              <a:t>maken</a:t>
+            </a:r>
+            <a:r>
+              <a:rPr lang="en-US" b="1" dirty="0"/>
+              <a:t> </a:t>
+            </a:r>
+            <a:r>
+              <a:rPr lang="en-US" b="1" dirty="0" err="1"/>
+              <a:t>namelijk</a:t>
+            </a:r>
+            <a:r>
+              <a:rPr lang="en-US" b="1" dirty="0"/>
+              <a:t> </a:t>
+            </a:r>
+            <a:r>
+              <a:rPr lang="en-US" b="1" dirty="0" err="1"/>
+              <a:t>gebruik</a:t>
+            </a:r>
+            <a:r>
+              <a:rPr lang="en-US" b="1" dirty="0"/>
+              <a:t> van end-to-end </a:t>
+            </a:r>
+            <a:r>
+              <a:rPr lang="en-US" b="1" dirty="0" err="1"/>
+              <a:t>addressering</a:t>
+            </a:r>
+            <a:r>
+              <a:rPr lang="en-US" b="1" dirty="0"/>
+              <a:t> van de </a:t>
+            </a:r>
+            <a:r>
+              <a:rPr lang="en-US" b="1" dirty="0" err="1"/>
+              <a:t>bron</a:t>
+            </a:r>
+            <a:r>
+              <a:rPr lang="en-US" b="1" dirty="0"/>
+              <a:t> tot </a:t>
+            </a:r>
+            <a:r>
+              <a:rPr lang="en-US" b="1" dirty="0" err="1"/>
+              <a:t>bestemming</a:t>
+            </a:r>
+            <a:r>
+              <a:rPr lang="en-US" b="1" dirty="0"/>
+              <a:t>. </a:t>
+            </a:r>
+            <a:r>
+              <a:rPr lang="en-US" b="1" dirty="0" err="1"/>
+              <a:t>Soms</a:t>
+            </a:r>
+            <a:r>
+              <a:rPr lang="en-US" b="1" dirty="0"/>
+              <a:t> </a:t>
+            </a:r>
+            <a:r>
+              <a:rPr lang="en-US" b="1" dirty="0" err="1"/>
+              <a:t>kan</a:t>
+            </a:r>
+            <a:r>
+              <a:rPr lang="en-US" b="1" dirty="0"/>
+              <a:t> </a:t>
+            </a:r>
+            <a:r>
+              <a:rPr lang="en-US" b="1" dirty="0" err="1"/>
+              <a:t>dit</a:t>
+            </a:r>
+            <a:r>
+              <a:rPr lang="en-US" b="1" dirty="0"/>
+              <a:t> </a:t>
+            </a:r>
+            <a:r>
+              <a:rPr lang="en-US" b="1" dirty="0" err="1"/>
+              <a:t>verholpen</a:t>
+            </a:r>
+            <a:r>
+              <a:rPr lang="en-US" b="1" dirty="0"/>
+              <a:t> </a:t>
+            </a:r>
+            <a:r>
+              <a:rPr lang="en-US" b="1" dirty="0" err="1"/>
+              <a:t>worden</a:t>
+            </a:r>
+            <a:r>
+              <a:rPr lang="en-US" b="1" dirty="0"/>
+              <a:t> door static NAT mappings </a:t>
+            </a:r>
+            <a:r>
+              <a:rPr lang="en-US" b="1" dirty="0" err="1"/>
+              <a:t>te</a:t>
+            </a:r>
+            <a:r>
+              <a:rPr lang="en-US" b="1" dirty="0"/>
+              <a:t> </a:t>
+            </a:r>
+            <a:r>
+              <a:rPr lang="en-US" b="1" dirty="0" err="1"/>
+              <a:t>implementeren</a:t>
+            </a:r>
+            <a:r>
+              <a:rPr lang="en-US" b="1" dirty="0"/>
+              <a:t>.</a:t>
+            </a:r>
+          </a:p>
+          <a:p>
+            <a:pPr>
+              <a:buFontTx/>
+              <a:buNone/>
+            </a:pPr>
+            <a:r>
+              <a:rPr lang="en-US" b="1" dirty="0"/>
+              <a:t>3: het </a:t>
+            </a:r>
+            <a:r>
+              <a:rPr lang="en-US" b="1" dirty="0" err="1"/>
+              <a:t>wordt</a:t>
+            </a:r>
+            <a:r>
+              <a:rPr lang="en-US" b="1" dirty="0"/>
+              <a:t> </a:t>
+            </a:r>
+            <a:r>
+              <a:rPr lang="en-US" b="1" dirty="0" err="1"/>
+              <a:t>veel</a:t>
+            </a:r>
+            <a:r>
+              <a:rPr lang="en-US" b="1" dirty="0"/>
+              <a:t> </a:t>
+            </a:r>
+            <a:r>
+              <a:rPr lang="en-US" b="1" dirty="0" err="1"/>
+              <a:t>moeilijker</a:t>
+            </a:r>
+            <a:r>
+              <a:rPr lang="en-US" b="1" dirty="0"/>
+              <a:t> om </a:t>
+            </a:r>
+            <a:r>
+              <a:rPr lang="en-US" b="1" dirty="0" err="1"/>
+              <a:t>packetten</a:t>
+            </a:r>
+            <a:r>
+              <a:rPr lang="en-US" b="1" dirty="0"/>
+              <a:t> </a:t>
+            </a:r>
+            <a:r>
+              <a:rPr lang="en-US" b="1" dirty="0" err="1"/>
+              <a:t>te</a:t>
+            </a:r>
+            <a:r>
+              <a:rPr lang="en-US" b="1" dirty="0"/>
+              <a:t> </a:t>
+            </a:r>
+            <a:r>
+              <a:rPr lang="en-US" b="1" dirty="0" err="1"/>
+              <a:t>traceren</a:t>
+            </a:r>
+            <a:r>
+              <a:rPr lang="en-US" b="1" dirty="0"/>
+              <a:t> </a:t>
+            </a:r>
+            <a:r>
+              <a:rPr lang="en-US" b="1" dirty="0" err="1"/>
+              <a:t>en</a:t>
+            </a:r>
+            <a:r>
+              <a:rPr lang="en-US" b="1" dirty="0"/>
+              <a:t> </a:t>
+            </a:r>
+            <a:r>
+              <a:rPr lang="en-US" b="1" dirty="0" err="1"/>
+              <a:t>dit</a:t>
+            </a:r>
+            <a:r>
+              <a:rPr lang="en-US" b="1" dirty="0"/>
+              <a:t> </a:t>
+            </a:r>
+            <a:r>
+              <a:rPr lang="en-US" b="1" dirty="0" err="1"/>
+              <a:t>maakt</a:t>
+            </a:r>
+            <a:r>
+              <a:rPr lang="en-US" b="1" dirty="0"/>
+              <a:t> troubleshooting </a:t>
+            </a:r>
+            <a:r>
+              <a:rPr lang="en-US" b="1" dirty="0" err="1"/>
+              <a:t>moeilijker</a:t>
+            </a:r>
+            <a:r>
+              <a:rPr lang="en-US" b="1" dirty="0"/>
+              <a:t>.</a:t>
+            </a:r>
+          </a:p>
+          <a:p>
+            <a:pPr>
+              <a:buFontTx/>
+              <a:buNone/>
+            </a:pPr>
+            <a:r>
+              <a:rPr lang="en-US" b="1" dirty="0"/>
+              <a:t>4: </a:t>
+            </a:r>
+            <a:r>
+              <a:rPr lang="en-US" b="1" dirty="0" err="1"/>
+              <a:t>omdat</a:t>
+            </a:r>
+            <a:r>
+              <a:rPr lang="en-US" b="1" dirty="0"/>
+              <a:t> NAT warden in de header van de </a:t>
+            </a:r>
+            <a:r>
+              <a:rPr lang="en-US" b="1" dirty="0" err="1"/>
+              <a:t>packetten</a:t>
+            </a:r>
+            <a:r>
+              <a:rPr lang="en-US" b="1" dirty="0"/>
+              <a:t> </a:t>
+            </a:r>
+            <a:r>
+              <a:rPr lang="en-US" b="1" dirty="0" err="1"/>
+              <a:t>verandert</a:t>
+            </a:r>
+            <a:r>
+              <a:rPr lang="en-US" b="1" dirty="0"/>
+              <a:t> die </a:t>
+            </a:r>
+            <a:r>
+              <a:rPr lang="en-US" b="1" dirty="0" err="1"/>
+              <a:t>botsen</a:t>
+            </a:r>
+            <a:r>
+              <a:rPr lang="en-US" b="1" dirty="0"/>
+              <a:t> met de integrity checks die </a:t>
+            </a:r>
+            <a:r>
+              <a:rPr lang="en-US" b="1" dirty="0" err="1"/>
+              <a:t>gedaan</a:t>
+            </a:r>
+            <a:r>
+              <a:rPr lang="en-US" b="1" dirty="0"/>
+              <a:t> </a:t>
+            </a:r>
+            <a:r>
+              <a:rPr lang="en-US" b="1" dirty="0" err="1"/>
+              <a:t>worden</a:t>
+            </a:r>
+            <a:r>
+              <a:rPr lang="en-US" b="1" dirty="0"/>
+              <a:t> door tunneling protocols </a:t>
+            </a:r>
+            <a:r>
+              <a:rPr lang="en-US" b="1" dirty="0" err="1"/>
+              <a:t>zoals</a:t>
+            </a:r>
+            <a:r>
+              <a:rPr lang="en-US" b="1" dirty="0"/>
+              <a:t> IPsec.</a:t>
+            </a:r>
+          </a:p>
+          <a:p>
+            <a:pPr>
+              <a:buFontTx/>
+              <a:buNone/>
+            </a:pPr>
+            <a:r>
+              <a:rPr lang="en-US" b="1" dirty="0"/>
+              <a:t>5: services die </a:t>
+            </a:r>
+            <a:r>
+              <a:rPr lang="en-US" b="1" dirty="0" err="1"/>
+              <a:t>initiatie</a:t>
+            </a:r>
+            <a:r>
+              <a:rPr lang="en-US" b="1" dirty="0"/>
+              <a:t> van de TCP </a:t>
+            </a:r>
+            <a:r>
+              <a:rPr lang="en-US" b="1" dirty="0" err="1"/>
+              <a:t>connectie</a:t>
+            </a:r>
+            <a:r>
+              <a:rPr lang="en-US" b="1" dirty="0"/>
+              <a:t> </a:t>
+            </a:r>
+            <a:r>
+              <a:rPr lang="en-US" b="1" dirty="0" err="1"/>
+              <a:t>nodig</a:t>
+            </a:r>
+            <a:r>
+              <a:rPr lang="en-US" b="1" dirty="0"/>
+              <a:t> </a:t>
+            </a:r>
+            <a:r>
+              <a:rPr lang="en-US" b="1" dirty="0" err="1"/>
+              <a:t>hebben</a:t>
+            </a:r>
+            <a:r>
+              <a:rPr lang="en-US" b="1" dirty="0"/>
+              <a:t> van het </a:t>
+            </a:r>
+            <a:r>
+              <a:rPr lang="en-US" b="1" dirty="0" err="1"/>
+              <a:t>externe</a:t>
+            </a:r>
+            <a:r>
+              <a:rPr lang="en-US" b="1" dirty="0"/>
+              <a:t> internet of stateless </a:t>
+            </a:r>
+            <a:r>
+              <a:rPr lang="en-US" b="1" dirty="0" err="1"/>
+              <a:t>protocals</a:t>
+            </a:r>
+            <a:r>
+              <a:rPr lang="en-US" b="1" dirty="0"/>
+              <a:t> </a:t>
+            </a:r>
+            <a:r>
+              <a:rPr lang="en-US" b="1" dirty="0" err="1"/>
+              <a:t>zoals</a:t>
+            </a:r>
+            <a:r>
+              <a:rPr lang="en-US" b="1" dirty="0"/>
+              <a:t> UDP </a:t>
+            </a:r>
+            <a:r>
+              <a:rPr lang="en-US" b="1" dirty="0" err="1"/>
+              <a:t>kunnen</a:t>
+            </a:r>
+            <a:r>
+              <a:rPr lang="en-US" b="1" dirty="0"/>
+              <a:t> </a:t>
+            </a:r>
+            <a:r>
+              <a:rPr lang="en-US" b="1" dirty="0" err="1"/>
+              <a:t>onderbroken</a:t>
+            </a:r>
+            <a:r>
+              <a:rPr lang="en-US" b="1" dirty="0"/>
+              <a:t> </a:t>
+            </a:r>
+            <a:r>
+              <a:rPr lang="en-US" b="1" dirty="0" err="1"/>
+              <a:t>worden</a:t>
+            </a:r>
+            <a:r>
+              <a:rPr lang="en-US" b="1" dirty="0"/>
+              <a:t>, </a:t>
+            </a:r>
+            <a:r>
+              <a:rPr lang="en-US" b="1" dirty="0" err="1"/>
+              <a:t>tenzei</a:t>
+            </a:r>
+            <a:r>
+              <a:rPr lang="en-US" b="1" dirty="0"/>
+              <a:t> de NAT router </a:t>
+            </a:r>
+            <a:r>
+              <a:rPr lang="en-US" b="1" dirty="0" err="1"/>
+              <a:t>geconfigureerd</a:t>
+            </a:r>
+            <a:r>
+              <a:rPr lang="en-US" b="1" dirty="0"/>
+              <a:t> is die </a:t>
+            </a:r>
+            <a:r>
+              <a:rPr lang="en-US" b="1" dirty="0" err="1"/>
+              <a:t>protocollen</a:t>
+            </a:r>
+            <a:r>
+              <a:rPr lang="en-US" b="1" dirty="0"/>
+              <a:t> </a:t>
+            </a:r>
+            <a:r>
+              <a:rPr lang="en-US" b="1" dirty="0" err="1"/>
+              <a:t>te</a:t>
+            </a:r>
+            <a:r>
+              <a:rPr lang="en-US" b="1" dirty="0"/>
+              <a:t> </a:t>
+            </a:r>
+            <a:r>
+              <a:rPr lang="en-US" b="1" dirty="0" err="1"/>
+              <a:t>ondersteunen</a:t>
+            </a:r>
+            <a:r>
+              <a:rPr lang="en-US" b="1" dirty="0"/>
+              <a:t>.</a:t>
+            </a:r>
+          </a:p>
+          <a:p>
+            <a:pPr>
+              <a:buFontTx/>
+              <a:buNone/>
+            </a:pPr>
+            <a:r>
+              <a:rPr lang="en-US" b="1" dirty="0"/>
+              <a:t>KENZO</a:t>
+            </a:r>
           </a:p>
         </p:txBody>
       </p:sp>
@@ -5279,12 +7400,171 @@
             </a:pPr>
             <a:r>
               <a:rPr lang="en-US" b="1" dirty="0"/>
-              <a:t>Prefix </a:t>
-            </a:r>
-            <a:r>
-              <a:rPr lang="en-US" b="1" dirty="0" err="1"/>
-              <a:t>opzoeken</a:t>
-            </a:r>
+              <a:t>Ranges private addresses </a:t>
+            </a:r>
+            <a:r>
+              <a:rPr lang="en-US" b="1" dirty="0" err="1"/>
+              <a:t>beschreven</a:t>
+            </a:r>
+            <a:r>
+              <a:rPr lang="en-US" b="1" dirty="0"/>
+              <a:t> in RFC1918, </a:t>
+            </a:r>
+            <a:r>
+              <a:rPr lang="en-US" b="1" dirty="0" err="1"/>
+              <a:t>mogen</a:t>
+            </a:r>
+            <a:r>
+              <a:rPr lang="en-US" b="1" dirty="0"/>
+              <a:t> </a:t>
+            </a:r>
+            <a:r>
+              <a:rPr lang="en-US" b="1" dirty="0" err="1"/>
+              <a:t>alleen</a:t>
+            </a:r>
+            <a:r>
+              <a:rPr lang="en-US" b="1" dirty="0"/>
+              <a:t> </a:t>
+            </a:r>
+            <a:r>
+              <a:rPr lang="en-US" b="1" dirty="0" err="1"/>
+              <a:t>als</a:t>
+            </a:r>
+            <a:r>
+              <a:rPr lang="en-US" b="1" dirty="0"/>
+              <a:t> private address </a:t>
+            </a:r>
+            <a:r>
+              <a:rPr lang="en-US" b="1" dirty="0" err="1"/>
+              <a:t>gebruikt</a:t>
+            </a:r>
+            <a:r>
+              <a:rPr lang="en-US" b="1" dirty="0"/>
+              <a:t> </a:t>
+            </a:r>
+            <a:r>
+              <a:rPr lang="en-US" b="1" dirty="0" err="1"/>
+              <a:t>worden</a:t>
+            </a:r>
+            <a:r>
+              <a:rPr lang="en-US" b="1" dirty="0"/>
+              <a:t>,</a:t>
+            </a:r>
+          </a:p>
+          <a:p>
+            <a:pPr>
+              <a:buFontTx/>
+              <a:buNone/>
+            </a:pPr>
+            <a:r>
+              <a:rPr lang="en-US" b="1" dirty="0"/>
+              <a:t>Private </a:t>
+            </a:r>
+            <a:r>
+              <a:rPr lang="en-US" b="1" dirty="0" err="1"/>
+              <a:t>ip</a:t>
+            </a:r>
+            <a:r>
+              <a:rPr lang="en-US" b="1" dirty="0"/>
+              <a:t> </a:t>
+            </a:r>
+            <a:r>
+              <a:rPr lang="en-US" b="1" dirty="0" err="1"/>
+              <a:t>wordt</a:t>
+            </a:r>
+            <a:r>
+              <a:rPr lang="en-US" b="1" dirty="0"/>
+              <a:t> </a:t>
+            </a:r>
+            <a:r>
+              <a:rPr lang="en-US" b="1" dirty="0" err="1"/>
+              <a:t>vertaald</a:t>
+            </a:r>
+            <a:r>
+              <a:rPr lang="en-US" b="1" dirty="0"/>
+              <a:t> door </a:t>
+            </a:r>
+            <a:r>
+              <a:rPr lang="en-US" b="1" dirty="0" err="1"/>
+              <a:t>nat</a:t>
+            </a:r>
+            <a:r>
+              <a:rPr lang="en-US" b="1" dirty="0"/>
+              <a:t> router </a:t>
+            </a:r>
+            <a:r>
+              <a:rPr lang="en-US" b="1" dirty="0" err="1"/>
+              <a:t>wanneer</a:t>
+            </a:r>
+            <a:r>
+              <a:rPr lang="en-US" b="1" dirty="0"/>
+              <a:t> men op het internet </a:t>
+            </a:r>
+            <a:r>
+              <a:rPr lang="en-US" b="1" dirty="0" err="1"/>
+              <a:t>gaat</a:t>
+            </a:r>
+            <a:endParaRPr lang="en-US" b="1" dirty="0"/>
+          </a:p>
+          <a:p>
+            <a:pPr>
+              <a:buFontTx/>
+              <a:buNone/>
+            </a:pPr>
+            <a:r>
+              <a:rPr lang="en-US" b="1" dirty="0" err="1"/>
+              <a:t>Zonder</a:t>
+            </a:r>
+            <a:r>
+              <a:rPr lang="en-US" b="1" dirty="0"/>
+              <a:t> </a:t>
+            </a:r>
+            <a:r>
+              <a:rPr lang="en-US" b="1" dirty="0" err="1"/>
+              <a:t>nat</a:t>
+            </a:r>
+            <a:r>
+              <a:rPr lang="en-US" b="1" dirty="0"/>
+              <a:t> </a:t>
+            </a:r>
+            <a:r>
+              <a:rPr lang="en-US" b="1" dirty="0" err="1"/>
+              <a:t>waren</a:t>
+            </a:r>
+            <a:r>
+              <a:rPr lang="en-US" b="1" dirty="0"/>
+              <a:t> de ipv4 </a:t>
+            </a:r>
+            <a:r>
+              <a:rPr lang="en-US" b="1" dirty="0" err="1"/>
+              <a:t>adressen</a:t>
+            </a:r>
+            <a:r>
+              <a:rPr lang="en-US" b="1" dirty="0"/>
+              <a:t> al </a:t>
+            </a:r>
+            <a:r>
+              <a:rPr lang="en-US" b="1" dirty="0" err="1"/>
+              <a:t>voor</a:t>
+            </a:r>
+            <a:r>
+              <a:rPr lang="en-US" b="1" dirty="0"/>
+              <a:t> het </a:t>
+            </a:r>
+            <a:r>
+              <a:rPr lang="en-US" b="1" dirty="0" err="1"/>
+              <a:t>jaar</a:t>
+            </a:r>
+            <a:r>
+              <a:rPr lang="en-US" b="1" dirty="0"/>
+              <a:t> 2000 op,</a:t>
+            </a:r>
+          </a:p>
+          <a:p>
+            <a:pPr>
+              <a:buFontTx/>
+              <a:buNone/>
+            </a:pPr>
             <a:endParaRPr lang="en-US" b="1" dirty="0"/>
           </a:p>
         </p:txBody>
@@ -5390,6 +7670,204 @@
               </a:rPr>
               <a:t>What is NAT?</a:t>
             </a:r>
+          </a:p>
+          <a:p>
+            <a:pPr>
+              <a:buFontTx/>
+              <a:buNone/>
+            </a:pPr>
+            <a:r>
+              <a:rPr lang="en-US" b="1" dirty="0" err="1">
+                <a:ea typeface="ＭＳ Ｐゴシック" pitchFamily="34" charset="-128"/>
+              </a:rPr>
+              <a:t>Er</a:t>
+            </a:r>
+            <a:r>
+              <a:rPr lang="en-US" b="1" dirty="0">
+                <a:ea typeface="ＭＳ Ｐゴシック" pitchFamily="34" charset="-128"/>
+              </a:rPr>
+              <a:t> </a:t>
+            </a:r>
+            <a:r>
+              <a:rPr lang="en-US" b="1" dirty="0" err="1">
+                <a:ea typeface="ＭＳ Ｐゴシック" pitchFamily="34" charset="-128"/>
+              </a:rPr>
+              <a:t>kunnen</a:t>
+            </a:r>
+            <a:r>
+              <a:rPr lang="en-US" b="1" dirty="0">
+                <a:ea typeface="ＭＳ Ｐゴシック" pitchFamily="34" charset="-128"/>
+              </a:rPr>
+              <a:t> </a:t>
+            </a:r>
+            <a:r>
+              <a:rPr lang="en-US" b="1" dirty="0" err="1">
+                <a:ea typeface="ＭＳ Ｐゴシック" pitchFamily="34" charset="-128"/>
+              </a:rPr>
+              <a:t>meerdere</a:t>
+            </a:r>
+            <a:r>
+              <a:rPr lang="en-US" b="1" dirty="0">
+                <a:ea typeface="ＭＳ Ｐゴシック" pitchFamily="34" charset="-128"/>
+              </a:rPr>
+              <a:t> public ipv4 </a:t>
+            </a:r>
+            <a:r>
+              <a:rPr lang="en-US" b="1" dirty="0" err="1">
+                <a:ea typeface="ＭＳ Ｐゴシック" pitchFamily="34" charset="-128"/>
+              </a:rPr>
+              <a:t>adressen</a:t>
+            </a:r>
+            <a:r>
+              <a:rPr lang="en-US" b="1" dirty="0">
+                <a:ea typeface="ＭＳ Ｐゴシック" pitchFamily="34" charset="-128"/>
+              </a:rPr>
+              <a:t> </a:t>
+            </a:r>
+            <a:r>
+              <a:rPr lang="en-US" b="1" dirty="0" err="1">
+                <a:ea typeface="ＭＳ Ｐゴシック" pitchFamily="34" charset="-128"/>
+              </a:rPr>
+              <a:t>aan</a:t>
+            </a:r>
+            <a:r>
+              <a:rPr lang="en-US" b="1" dirty="0">
+                <a:ea typeface="ＭＳ Ｐゴシック" pitchFamily="34" charset="-128"/>
+              </a:rPr>
+              <a:t> 1 router </a:t>
+            </a:r>
+            <a:r>
+              <a:rPr lang="en-US" b="1" dirty="0" err="1">
+                <a:ea typeface="ＭＳ Ｐゴシック" pitchFamily="34" charset="-128"/>
+              </a:rPr>
+              <a:t>worden</a:t>
+            </a:r>
+            <a:r>
+              <a:rPr lang="en-US" b="1" dirty="0">
+                <a:ea typeface="ＭＳ Ｐゴシック" pitchFamily="34" charset="-128"/>
+              </a:rPr>
+              <a:t> </a:t>
+            </a:r>
+            <a:r>
+              <a:rPr lang="en-US" b="1" dirty="0" err="1">
+                <a:ea typeface="ＭＳ Ｐゴシック" pitchFamily="34" charset="-128"/>
+              </a:rPr>
+              <a:t>toegekent</a:t>
+            </a:r>
+            <a:r>
+              <a:rPr lang="en-US" b="1" dirty="0">
+                <a:ea typeface="ＭＳ Ｐゴシック" pitchFamily="34" charset="-128"/>
+              </a:rPr>
+              <a:t>.</a:t>
+            </a:r>
+          </a:p>
+          <a:p>
+            <a:pPr>
+              <a:buFontTx/>
+              <a:buNone/>
+            </a:pPr>
+            <a:r>
+              <a:rPr lang="en-US" b="1" dirty="0" err="1">
+                <a:ea typeface="ＭＳ Ｐゴシック" pitchFamily="34" charset="-128"/>
+              </a:rPr>
+              <a:t>Wanneer</a:t>
+            </a:r>
+            <a:r>
+              <a:rPr lang="en-US" b="1" dirty="0">
+                <a:ea typeface="ＭＳ Ｐゴシック" pitchFamily="34" charset="-128"/>
+              </a:rPr>
+              <a:t> </a:t>
+            </a:r>
+            <a:r>
+              <a:rPr lang="en-US" b="1" dirty="0" err="1">
+                <a:ea typeface="ＭＳ Ｐゴシック" pitchFamily="34" charset="-128"/>
+              </a:rPr>
+              <a:t>dit</a:t>
+            </a:r>
+            <a:r>
+              <a:rPr lang="en-US" b="1" dirty="0">
+                <a:ea typeface="ＭＳ Ｐゴシック" pitchFamily="34" charset="-128"/>
+              </a:rPr>
+              <a:t> het </a:t>
+            </a:r>
+            <a:r>
+              <a:rPr lang="en-US" b="1" dirty="0" err="1">
+                <a:ea typeface="ＭＳ Ｐゴシック" pitchFamily="34" charset="-128"/>
+              </a:rPr>
+              <a:t>geval</a:t>
+            </a:r>
+            <a:r>
+              <a:rPr lang="en-US" b="1" dirty="0">
+                <a:ea typeface="ＭＳ Ｐゴシック" pitchFamily="34" charset="-128"/>
+              </a:rPr>
+              <a:t> is </a:t>
+            </a:r>
+            <a:r>
+              <a:rPr lang="en-US" b="1" dirty="0" err="1">
+                <a:ea typeface="ＭＳ Ｐゴシック" pitchFamily="34" charset="-128"/>
+              </a:rPr>
+              <a:t>worden</a:t>
+            </a:r>
+            <a:r>
+              <a:rPr lang="en-US" b="1" dirty="0">
+                <a:ea typeface="ＭＳ Ｐゴシック" pitchFamily="34" charset="-128"/>
+              </a:rPr>
+              <a:t> die </a:t>
+            </a:r>
+            <a:r>
+              <a:rPr lang="en-US" b="1" dirty="0" err="1">
+                <a:ea typeface="ＭＳ Ｐゴシック" pitchFamily="34" charset="-128"/>
+              </a:rPr>
+              <a:t>publix</a:t>
+            </a:r>
+            <a:r>
+              <a:rPr lang="en-US" b="1" dirty="0">
+                <a:ea typeface="ＭＳ Ｐゴシック" pitchFamily="34" charset="-128"/>
+              </a:rPr>
+              <a:t> ipv4 </a:t>
+            </a:r>
+            <a:r>
+              <a:rPr lang="en-US" b="1" dirty="0" err="1">
+                <a:ea typeface="ＭＳ Ｐゴシック" pitchFamily="34" charset="-128"/>
+              </a:rPr>
+              <a:t>adressen</a:t>
+            </a:r>
+            <a:r>
+              <a:rPr lang="en-US" b="1" dirty="0">
+                <a:ea typeface="ＭＳ Ｐゴシック" pitchFamily="34" charset="-128"/>
+              </a:rPr>
+              <a:t> de </a:t>
+            </a:r>
+            <a:r>
+              <a:rPr lang="en-US" b="1" dirty="0" err="1">
+                <a:ea typeface="ＭＳ Ｐゴシック" pitchFamily="34" charset="-128"/>
+              </a:rPr>
+              <a:t>nat</a:t>
+            </a:r>
+            <a:r>
+              <a:rPr lang="en-US" b="1" dirty="0">
+                <a:ea typeface="ＭＳ Ｐゴシック" pitchFamily="34" charset="-128"/>
+              </a:rPr>
+              <a:t> pool </a:t>
+            </a:r>
+            <a:r>
+              <a:rPr lang="en-US" b="1" dirty="0" err="1">
+                <a:ea typeface="ＭＳ Ｐゴシック" pitchFamily="34" charset="-128"/>
+              </a:rPr>
+              <a:t>genoemt</a:t>
+            </a:r>
+            <a:r>
+              <a:rPr lang="en-US" b="1" dirty="0">
+                <a:ea typeface="ＭＳ Ｐゴシック" pitchFamily="34" charset="-128"/>
+              </a:rPr>
+              <a:t>.</a:t>
+            </a:r>
+          </a:p>
+          <a:p>
+            <a:pPr>
+              <a:buFontTx/>
+              <a:buNone/>
+            </a:pPr>
             <a:endParaRPr lang="en-US" b="1" dirty="0"/>
           </a:p>
           <a:p>
@@ -5515,6 +7993,224 @@
               <a:buFontTx/>
               <a:buNone/>
             </a:pPr>
+            <a:r>
+              <a:rPr lang="en-US" b="1" dirty="0" err="1"/>
+              <a:t>Stuknetwerk</a:t>
+            </a:r>
+            <a:r>
+              <a:rPr lang="en-US" b="1" dirty="0"/>
+              <a:t> is </a:t>
+            </a:r>
+            <a:r>
+              <a:rPr lang="en-US" b="1" dirty="0" err="1"/>
+              <a:t>een</a:t>
+            </a:r>
+            <a:r>
+              <a:rPr lang="en-US" b="1" dirty="0"/>
+              <a:t> </a:t>
+            </a:r>
+            <a:r>
+              <a:rPr lang="en-US" b="1" dirty="0" err="1"/>
+              <a:t>netwerk</a:t>
+            </a:r>
+            <a:r>
+              <a:rPr lang="en-US" b="1" dirty="0"/>
+              <a:t> met maar 1 </a:t>
+            </a:r>
+            <a:r>
+              <a:rPr lang="en-US" b="1" dirty="0" err="1"/>
+              <a:t>enkele</a:t>
+            </a:r>
+            <a:r>
+              <a:rPr lang="en-US" b="1" dirty="0"/>
+              <a:t> </a:t>
+            </a:r>
+            <a:r>
+              <a:rPr lang="en-US" b="1" dirty="0" err="1"/>
+              <a:t>verbinden</a:t>
+            </a:r>
+            <a:r>
+              <a:rPr lang="en-US" b="1" dirty="0"/>
+              <a:t> </a:t>
+            </a:r>
+            <a:r>
+              <a:rPr lang="en-US" b="1" dirty="0" err="1"/>
+              <a:t>naar</a:t>
+            </a:r>
+            <a:r>
+              <a:rPr lang="en-US" b="1" dirty="0"/>
+              <a:t> het network </a:t>
+            </a:r>
+            <a:r>
+              <a:rPr lang="en-US" b="1" dirty="0" err="1"/>
+              <a:t>ernaast</a:t>
+            </a:r>
+            <a:r>
+              <a:rPr lang="en-US" b="1" dirty="0"/>
+              <a:t>, </a:t>
+            </a:r>
+            <a:r>
+              <a:rPr lang="en-US" b="1" dirty="0" err="1"/>
+              <a:t>dit</a:t>
+            </a:r>
+            <a:r>
+              <a:rPr lang="en-US" b="1" dirty="0"/>
+              <a:t> </a:t>
+            </a:r>
+            <a:r>
+              <a:rPr lang="en-US" b="1" dirty="0" err="1"/>
+              <a:t>wil</a:t>
+            </a:r>
+            <a:r>
+              <a:rPr lang="en-US" b="1" dirty="0"/>
+              <a:t> </a:t>
+            </a:r>
+            <a:r>
+              <a:rPr lang="en-US" b="1" dirty="0" err="1"/>
+              <a:t>zeggen</a:t>
+            </a:r>
+            <a:r>
+              <a:rPr lang="en-US" b="1" dirty="0"/>
+              <a:t>: 1 </a:t>
+            </a:r>
+            <a:r>
+              <a:rPr lang="en-US" b="1" dirty="0" err="1"/>
+              <a:t>weg</a:t>
+            </a:r>
+            <a:r>
+              <a:rPr lang="en-US" b="1" dirty="0"/>
+              <a:t> </a:t>
+            </a:r>
+            <a:r>
+              <a:rPr lang="en-US" b="1" dirty="0" err="1"/>
+              <a:t>naar</a:t>
+            </a:r>
+            <a:r>
+              <a:rPr lang="en-US" b="1" dirty="0"/>
+              <a:t> </a:t>
+            </a:r>
+            <a:r>
+              <a:rPr lang="en-US" b="1" dirty="0" err="1"/>
+              <a:t>binnen</a:t>
+            </a:r>
+            <a:r>
+              <a:rPr lang="en-US" b="1" dirty="0"/>
+              <a:t> </a:t>
+            </a:r>
+            <a:r>
+              <a:rPr lang="en-US" b="1" dirty="0" err="1"/>
+              <a:t>en</a:t>
+            </a:r>
+            <a:r>
+              <a:rPr lang="en-US" b="1" dirty="0"/>
+              <a:t> 1 </a:t>
+            </a:r>
+            <a:r>
+              <a:rPr lang="en-US" b="1" dirty="0" err="1"/>
+              <a:t>naar</a:t>
+            </a:r>
+            <a:r>
+              <a:rPr lang="en-US" b="1" dirty="0"/>
+              <a:t> </a:t>
+            </a:r>
+            <a:r>
+              <a:rPr lang="en-US" b="1" dirty="0" err="1"/>
+              <a:t>buiten</a:t>
+            </a:r>
+            <a:r>
+              <a:rPr lang="en-US" b="1" dirty="0"/>
+              <a:t>,</a:t>
+            </a:r>
+          </a:p>
+          <a:p>
+            <a:pPr>
+              <a:buFontTx/>
+              <a:buNone/>
+            </a:pPr>
+            <a:r>
+              <a:rPr lang="en-US" b="1" dirty="0" err="1"/>
+              <a:t>Pakket</a:t>
+            </a:r>
+            <a:r>
+              <a:rPr lang="en-US" b="1" dirty="0"/>
+              <a:t> </a:t>
+            </a:r>
+            <a:r>
+              <a:rPr lang="en-US" b="1" dirty="0" err="1"/>
+              <a:t>dat</a:t>
+            </a:r>
+            <a:r>
+              <a:rPr lang="en-US" b="1" dirty="0"/>
+              <a:t> </a:t>
+            </a:r>
+            <a:r>
+              <a:rPr lang="en-US" b="1" dirty="0" err="1"/>
+              <a:t>naar</a:t>
+            </a:r>
+            <a:r>
+              <a:rPr lang="en-US" b="1" dirty="0"/>
+              <a:t> extern </a:t>
+            </a:r>
+            <a:r>
+              <a:rPr lang="en-US" b="1" dirty="0" err="1"/>
+              <a:t>natwerk</a:t>
+            </a:r>
+            <a:r>
+              <a:rPr lang="en-US" b="1" dirty="0"/>
+              <a:t> </a:t>
+            </a:r>
+            <a:r>
+              <a:rPr lang="en-US" b="1" dirty="0" err="1"/>
+              <a:t>wordt</a:t>
+            </a:r>
+            <a:r>
+              <a:rPr lang="en-US" b="1" dirty="0"/>
+              <a:t> </a:t>
+            </a:r>
+            <a:r>
+              <a:rPr lang="en-US" b="1" dirty="0" err="1"/>
+              <a:t>verstuurd</a:t>
+            </a:r>
+            <a:r>
+              <a:rPr lang="en-US" b="1" dirty="0"/>
+              <a:t> </a:t>
+            </a:r>
+            <a:r>
+              <a:rPr lang="en-US" b="1" dirty="0" err="1"/>
+              <a:t>wordt</a:t>
+            </a:r>
+            <a:r>
+              <a:rPr lang="en-US" b="1" dirty="0"/>
+              <a:t> </a:t>
+            </a:r>
+            <a:r>
+              <a:rPr lang="en-US" b="1" dirty="0" err="1"/>
+              <a:t>geforward</a:t>
+            </a:r>
+            <a:r>
+              <a:rPr lang="en-US" b="1" dirty="0"/>
+              <a:t> </a:t>
+            </a:r>
+            <a:r>
+              <a:rPr lang="en-US" b="1" dirty="0" err="1"/>
+              <a:t>voor</a:t>
+            </a:r>
+            <a:r>
+              <a:rPr lang="en-US" b="1" dirty="0"/>
+              <a:t> de border router die het </a:t>
+            </a:r>
+            <a:r>
+              <a:rPr lang="en-US" b="1" dirty="0" err="1"/>
+              <a:t>nat</a:t>
+            </a:r>
+            <a:r>
+              <a:rPr lang="en-US" b="1" dirty="0"/>
+              <a:t> process </a:t>
+            </a:r>
+            <a:r>
+              <a:rPr lang="en-US" b="1" dirty="0" err="1"/>
+              <a:t>uitvoert</a:t>
+            </a:r>
             <a:endParaRPr lang="en-US" b="1" dirty="0"/>
           </a:p>
         </p:txBody>
@@ -5616,7 +8312,6 @@
               </a:rPr>
               <a:t>NAT Terminology</a:t>
             </a:r>
-            <a:endParaRPr lang="en-US" b="1" dirty="0"/>
           </a:p>
           <a:p>
             <a:pPr>
@@ -5625,13 +8320,87 @@
             </a:pPr>
             <a:r>
               <a:rPr lang="en-US" b="1" dirty="0"/>
-              <a:t>Sa da </a:t>
-            </a:r>
-            <a:r>
-              <a:rPr lang="en-US" b="1" dirty="0" err="1"/>
-              <a:t>opzoeken</a:t>
+              <a:t>Local address: local address is </a:t>
+            </a:r>
+            <a:r>
+              <a:rPr lang="en-US" b="1" dirty="0" err="1"/>
+              <a:t>een</a:t>
+            </a:r>
+            <a:r>
+              <a:rPr lang="en-US" b="1" dirty="0"/>
+              <a:t> address </a:t>
+            </a:r>
+            <a:r>
+              <a:rPr lang="en-US" b="1" dirty="0" err="1"/>
+              <a:t>bekeken</a:t>
+            </a:r>
+            <a:r>
+              <a:rPr lang="en-US" b="1" dirty="0"/>
+              <a:t> </a:t>
+            </a:r>
+            <a:r>
+              <a:rPr lang="en-US" b="1" dirty="0" err="1"/>
+              <a:t>vanuit</a:t>
+            </a:r>
+            <a:r>
+              <a:rPr lang="en-US" b="1" dirty="0"/>
+              <a:t> het interne </a:t>
+            </a:r>
+            <a:r>
+              <a:rPr lang="en-US" b="1" dirty="0" err="1"/>
+              <a:t>netwerk</a:t>
             </a:r>
             <a:endParaRPr lang="en-US" b="1" dirty="0"/>
+          </a:p>
+          <a:p>
+            <a:pPr>
+              <a:buFontTx/>
+              <a:buNone/>
+            </a:pPr>
+            <a:r>
+              <a:rPr lang="en-US" b="1" dirty="0"/>
+              <a:t>Global address: </a:t>
+            </a:r>
+            <a:r>
+              <a:rPr lang="en-US" b="1" dirty="0" err="1"/>
+              <a:t>een</a:t>
+            </a:r>
+            <a:r>
+              <a:rPr lang="en-US" b="1" dirty="0"/>
+              <a:t> global address is </a:t>
+            </a:r>
+            <a:r>
+              <a:rPr lang="en-US" b="1" dirty="0" err="1"/>
+              <a:t>een</a:t>
+            </a:r>
+            <a:r>
+              <a:rPr lang="en-US" b="1" dirty="0"/>
+              <a:t> address </a:t>
+            </a:r>
+            <a:r>
+              <a:rPr lang="en-US" b="1" dirty="0" err="1"/>
+              <a:t>bekenen</a:t>
+            </a:r>
+            <a:r>
+              <a:rPr lang="en-US" b="1" dirty="0"/>
+              <a:t> </a:t>
+            </a:r>
+            <a:r>
+              <a:rPr lang="en-US" b="1" dirty="0" err="1"/>
+              <a:t>vanuit</a:t>
+            </a:r>
+            <a:r>
+              <a:rPr lang="en-US" b="1" dirty="0"/>
+              <a:t> </a:t>
+            </a:r>
+            <a:r>
+              <a:rPr lang="en-US" b="1" dirty="0" err="1"/>
+              <a:t>een</a:t>
+            </a:r>
+            <a:r>
+              <a:rPr lang="en-US" b="1" dirty="0"/>
+              <a:t> extern network</a:t>
+            </a:r>
           </a:p>
         </p:txBody>
       </p:sp>
@@ -5739,6 +8508,470 @@
               <a:t> Terminology (cont.)</a:t>
             </a:r>
             <a:endParaRPr lang="en-US" b="1" dirty="0"/>
+          </a:p>
+          <a:p>
+            <a:pPr>
+              <a:buFontTx/>
+              <a:buNone/>
+            </a:pPr>
+            <a:r>
+              <a:rPr lang="en-US" b="1" dirty="0"/>
+              <a:t>Inside local address: 192,168,10,10 </a:t>
+            </a:r>
+            <a:r>
+              <a:rPr lang="en-US" b="1" dirty="0" err="1"/>
+              <a:t>vanuit</a:t>
+            </a:r>
+            <a:r>
+              <a:rPr lang="en-US" b="1" dirty="0"/>
+              <a:t> </a:t>
+            </a:r>
+            <a:r>
+              <a:rPr lang="en-US" b="1" dirty="0" err="1"/>
+              <a:t>perspectief</a:t>
+            </a:r>
+            <a:r>
+              <a:rPr lang="en-US" b="1" dirty="0"/>
+              <a:t> pc1</a:t>
+            </a:r>
+          </a:p>
+          <a:p>
+            <a:pPr>
+              <a:buFontTx/>
+              <a:buNone/>
+            </a:pPr>
+            <a:r>
+              <a:rPr lang="en-US" b="1" dirty="0" err="1"/>
+              <a:t>Websever</a:t>
+            </a:r>
+            <a:r>
+              <a:rPr lang="en-US" b="1" dirty="0"/>
+              <a:t> met outside address 209,165,201,1</a:t>
+            </a:r>
+          </a:p>
+          <a:p>
+            <a:pPr>
+              <a:buFontTx/>
+              <a:buNone/>
+            </a:pPr>
+            <a:r>
+              <a:rPr lang="en-US" b="1" dirty="0" err="1"/>
+              <a:t>Wanneer</a:t>
+            </a:r>
+            <a:r>
+              <a:rPr lang="en-US" b="1" dirty="0"/>
+              <a:t> </a:t>
+            </a:r>
+            <a:r>
+              <a:rPr lang="en-US" b="1" dirty="0" err="1"/>
+              <a:t>paketten</a:t>
+            </a:r>
+            <a:r>
+              <a:rPr lang="en-US" b="1" dirty="0"/>
+              <a:t> </a:t>
+            </a:r>
+            <a:r>
+              <a:rPr lang="en-US" b="1" dirty="0" err="1"/>
+              <a:t>verzonden</a:t>
+            </a:r>
+            <a:r>
+              <a:rPr lang="en-US" b="1" dirty="0"/>
+              <a:t> </a:t>
+            </a:r>
+            <a:r>
+              <a:rPr lang="en-US" b="1" dirty="0" err="1"/>
+              <a:t>worden</a:t>
+            </a:r>
+            <a:r>
+              <a:rPr lang="en-US" b="1" dirty="0"/>
+              <a:t> van PC1 </a:t>
+            </a:r>
+            <a:r>
+              <a:rPr lang="en-US" b="1" dirty="0" err="1"/>
+              <a:t>naar</a:t>
+            </a:r>
+            <a:r>
+              <a:rPr lang="en-US" b="1" dirty="0"/>
+              <a:t> de webserver, </a:t>
+            </a:r>
+            <a:r>
+              <a:rPr lang="en-US" b="1" dirty="0" err="1"/>
+              <a:t>wordt</a:t>
+            </a:r>
+            <a:r>
+              <a:rPr lang="en-US" b="1" dirty="0"/>
+              <a:t> het inside local address van¨PC1 </a:t>
+            </a:r>
+            <a:r>
+              <a:rPr lang="en-US" b="1" dirty="0" err="1"/>
+              <a:t>vertaald</a:t>
+            </a:r>
+            <a:r>
+              <a:rPr lang="en-US" b="1" dirty="0"/>
+              <a:t> </a:t>
+            </a:r>
+            <a:r>
+              <a:rPr lang="en-US" b="1" dirty="0" err="1"/>
+              <a:t>naar</a:t>
+            </a:r>
+            <a:r>
+              <a:rPr lang="en-US" b="1" dirty="0"/>
+              <a:t> 209,165,200,226 </a:t>
+            </a:r>
+            <a:r>
+              <a:rPr lang="en-US" b="1" dirty="0" err="1"/>
+              <a:t>en</a:t>
+            </a:r>
+            <a:r>
+              <a:rPr lang="en-US" b="1" dirty="0"/>
+              <a:t> </a:t>
+            </a:r>
+            <a:r>
+              <a:rPr lang="en-US" b="1" dirty="0" err="1"/>
+              <a:t>wordt</a:t>
+            </a:r>
+            <a:r>
+              <a:rPr lang="en-US" b="1" dirty="0"/>
+              <a:t> </a:t>
+            </a:r>
+            <a:r>
+              <a:rPr lang="en-US" b="1" dirty="0" err="1"/>
+              <a:t>dit</a:t>
+            </a:r>
+            <a:r>
+              <a:rPr lang="en-US" b="1" dirty="0"/>
+              <a:t> het inside global address,</a:t>
+            </a:r>
+          </a:p>
+          <a:p>
+            <a:pPr>
+              <a:buFontTx/>
+              <a:buNone/>
+            </a:pPr>
+            <a:r>
+              <a:rPr lang="en-US" b="1" dirty="0"/>
+              <a:t>Het address van </a:t>
+            </a:r>
+            <a:r>
+              <a:rPr lang="en-US" b="1" dirty="0" err="1"/>
+              <a:t>bv</a:t>
+            </a:r>
+            <a:r>
+              <a:rPr lang="en-US" b="1" dirty="0"/>
+              <a:t>. </a:t>
+            </a:r>
+            <a:r>
+              <a:rPr lang="en-US" b="1" dirty="0" err="1"/>
+              <a:t>een</a:t>
+            </a:r>
+            <a:r>
+              <a:rPr lang="en-US" b="1" dirty="0"/>
+              <a:t> webserver </a:t>
+            </a:r>
+            <a:r>
+              <a:rPr lang="en-US" b="1" dirty="0" err="1"/>
+              <a:t>wordt</a:t>
+            </a:r>
+            <a:r>
+              <a:rPr lang="en-US" b="1" dirty="0"/>
+              <a:t> in de </a:t>
+            </a:r>
+            <a:r>
+              <a:rPr lang="en-US" b="1" dirty="0" err="1"/>
+              <a:t>meeste</a:t>
+            </a:r>
+            <a:r>
+              <a:rPr lang="en-US" b="1" dirty="0"/>
+              <a:t> </a:t>
+            </a:r>
+            <a:r>
+              <a:rPr lang="en-US" b="1" dirty="0" err="1"/>
+              <a:t>gevallen</a:t>
+            </a:r>
+            <a:r>
+              <a:rPr lang="en-US" b="1" dirty="0"/>
+              <a:t> </a:t>
+            </a:r>
+            <a:r>
+              <a:rPr lang="en-US" b="1" dirty="0" err="1"/>
+              <a:t>niet</a:t>
+            </a:r>
+            <a:r>
+              <a:rPr lang="en-US" b="1" dirty="0"/>
+              <a:t> </a:t>
+            </a:r>
+            <a:r>
+              <a:rPr lang="en-US" b="1" dirty="0" err="1"/>
+              <a:t>vertaald</a:t>
+            </a:r>
+            <a:r>
+              <a:rPr lang="en-US" b="1" dirty="0"/>
+              <a:t>, want </a:t>
+            </a:r>
+            <a:r>
+              <a:rPr lang="en-US" b="1" dirty="0" err="1"/>
+              <a:t>dit</a:t>
+            </a:r>
+            <a:r>
+              <a:rPr lang="en-US" b="1" dirty="0"/>
+              <a:t> is </a:t>
+            </a:r>
+            <a:r>
+              <a:rPr lang="en-US" b="1" dirty="0" err="1"/>
+              <a:t>meestal</a:t>
+            </a:r>
+            <a:r>
+              <a:rPr lang="en-US" b="1" dirty="0"/>
+              <a:t> al </a:t>
+            </a:r>
+            <a:r>
+              <a:rPr lang="en-US" b="1" dirty="0" err="1"/>
+              <a:t>een</a:t>
+            </a:r>
+            <a:r>
+              <a:rPr lang="en-US" b="1" dirty="0"/>
+              <a:t> public IPv4 address,</a:t>
+            </a:r>
+          </a:p>
+          <a:p>
+            <a:pPr>
+              <a:buFontTx/>
+              <a:buNone/>
+            </a:pPr>
+            <a:r>
+              <a:rPr lang="en-US" b="1" dirty="0"/>
+              <a:t>In het </a:t>
+            </a:r>
+            <a:r>
+              <a:rPr lang="en-US" b="1" dirty="0" err="1"/>
+              <a:t>perspecief</a:t>
+            </a:r>
+            <a:r>
+              <a:rPr lang="en-US" b="1" dirty="0"/>
+              <a:t> van de webserver </a:t>
+            </a:r>
+            <a:r>
+              <a:rPr lang="en-US" b="1" dirty="0" err="1"/>
+              <a:t>lijken</a:t>
+            </a:r>
+            <a:r>
+              <a:rPr lang="en-US" b="1" dirty="0"/>
+              <a:t> de </a:t>
+            </a:r>
+            <a:r>
+              <a:rPr lang="en-US" b="1" dirty="0" err="1"/>
+              <a:t>paketten</a:t>
+            </a:r>
+            <a:r>
+              <a:rPr lang="en-US" b="1" dirty="0"/>
+              <a:t> van PC1 </a:t>
+            </a:r>
+            <a:r>
+              <a:rPr lang="en-US" b="1" dirty="0" err="1"/>
+              <a:t>te</a:t>
+            </a:r>
+            <a:r>
+              <a:rPr lang="en-US" b="1" dirty="0"/>
+              <a:t> </a:t>
+            </a:r>
+            <a:r>
+              <a:rPr lang="en-US" b="1" dirty="0" err="1"/>
+              <a:t>komen</a:t>
+            </a:r>
+            <a:r>
+              <a:rPr lang="en-US" b="1" dirty="0"/>
+              <a:t> van 209,165,200,226, het inside global address</a:t>
+            </a:r>
+          </a:p>
+          <a:p>
+            <a:pPr>
+              <a:buFontTx/>
+              <a:buNone/>
+            </a:pPr>
+            <a:r>
+              <a:rPr lang="en-US" b="1" dirty="0"/>
+              <a:t>De </a:t>
+            </a:r>
+            <a:r>
+              <a:rPr lang="en-US" b="1" dirty="0" err="1"/>
+              <a:t>nat</a:t>
+            </a:r>
+            <a:r>
+              <a:rPr lang="en-US" b="1" dirty="0"/>
+              <a:t> router R2 is punt </a:t>
+            </a:r>
+            <a:r>
+              <a:rPr lang="en-US" b="1" dirty="0" err="1"/>
+              <a:t>tussen</a:t>
+            </a:r>
+            <a:r>
+              <a:rPr lang="en-US" b="1" dirty="0"/>
+              <a:t> het inside </a:t>
+            </a:r>
+            <a:r>
+              <a:rPr lang="en-US" b="1" dirty="0" err="1"/>
+              <a:t>en</a:t>
+            </a:r>
+            <a:r>
+              <a:rPr lang="en-US" b="1" dirty="0"/>
+              <a:t> outside network </a:t>
+            </a:r>
+            <a:r>
+              <a:rPr lang="en-US" b="1" dirty="0" err="1"/>
+              <a:t>en</a:t>
+            </a:r>
+            <a:r>
+              <a:rPr lang="en-US" b="1" dirty="0"/>
+              <a:t> </a:t>
+            </a:r>
+            <a:r>
+              <a:rPr lang="en-US" b="1" dirty="0" err="1"/>
+              <a:t>dus</a:t>
+            </a:r>
+            <a:r>
+              <a:rPr lang="en-US" b="1" dirty="0"/>
+              <a:t> </a:t>
+            </a:r>
+            <a:r>
+              <a:rPr lang="en-US" b="1" dirty="0" err="1"/>
+              <a:t>tussen</a:t>
+            </a:r>
+            <a:r>
+              <a:rPr lang="en-US" b="1" dirty="0"/>
+              <a:t> local </a:t>
+            </a:r>
+            <a:r>
+              <a:rPr lang="en-US" b="1" dirty="0" err="1"/>
+              <a:t>en</a:t>
+            </a:r>
+            <a:r>
+              <a:rPr lang="en-US" b="1" dirty="0"/>
+              <a:t> global addresses</a:t>
+            </a:r>
+          </a:p>
+          <a:p>
+            <a:pPr>
+              <a:buFontTx/>
+              <a:buNone/>
+            </a:pPr>
+            <a:r>
+              <a:rPr lang="en-US" b="1" dirty="0"/>
+              <a:t>In </a:t>
+            </a:r>
+            <a:r>
+              <a:rPr lang="en-US" b="1" dirty="0" err="1"/>
+              <a:t>dit</a:t>
+            </a:r>
+            <a:r>
+              <a:rPr lang="en-US" b="1" dirty="0"/>
+              <a:t> </a:t>
+            </a:r>
+            <a:r>
+              <a:rPr lang="en-US" b="1" dirty="0" err="1"/>
+              <a:t>voorbeeld</a:t>
+            </a:r>
+            <a:r>
+              <a:rPr lang="en-US" b="1" dirty="0"/>
+              <a:t> is R2 </a:t>
+            </a:r>
+            <a:r>
+              <a:rPr lang="en-US" b="1" dirty="0" err="1"/>
+              <a:t>geconfigureerd</a:t>
+            </a:r>
+            <a:r>
+              <a:rPr lang="en-US" b="1" dirty="0"/>
+              <a:t> </a:t>
+            </a:r>
+            <a:r>
+              <a:rPr lang="en-US" b="1" dirty="0" err="1"/>
+              <a:t>als</a:t>
+            </a:r>
+            <a:r>
+              <a:rPr lang="en-US" b="1" dirty="0"/>
+              <a:t> NAT router, met </a:t>
+            </a:r>
+            <a:r>
+              <a:rPr lang="en-US" b="1" dirty="0" err="1"/>
+              <a:t>een</a:t>
+            </a:r>
+            <a:r>
+              <a:rPr lang="en-US" b="1" dirty="0"/>
+              <a:t> pool van public addresses die het </a:t>
+            </a:r>
+            <a:r>
+              <a:rPr lang="en-US" b="1" dirty="0" err="1"/>
+              <a:t>toedient</a:t>
+            </a:r>
+            <a:r>
+              <a:rPr lang="en-US" b="1" dirty="0"/>
+              <a:t> </a:t>
+            </a:r>
+            <a:r>
+              <a:rPr lang="en-US" b="1" dirty="0" err="1"/>
+              <a:t>aan</a:t>
+            </a:r>
+            <a:r>
+              <a:rPr lang="en-US" b="1" dirty="0"/>
+              <a:t> de inside </a:t>
+            </a:r>
+            <a:r>
+              <a:rPr lang="en-US" b="1" dirty="0" err="1"/>
+              <a:t>apparaten</a:t>
+            </a:r>
+            <a:r>
+              <a:rPr lang="en-US" b="1" dirty="0"/>
+              <a:t>,</a:t>
+            </a:r>
+          </a:p>
+          <a:p>
+            <a:pPr>
+              <a:buFontTx/>
+              <a:buNone/>
+            </a:pPr>
+            <a:r>
+              <a:rPr lang="en-US" b="1" dirty="0"/>
+              <a:t>In </a:t>
+            </a:r>
+            <a:r>
+              <a:rPr lang="en-US" b="1" dirty="0" err="1"/>
+              <a:t>dit</a:t>
+            </a:r>
+            <a:r>
+              <a:rPr lang="en-US" b="1" dirty="0"/>
+              <a:t> </a:t>
+            </a:r>
+            <a:r>
+              <a:rPr lang="en-US" b="1" dirty="0" err="1"/>
+              <a:t>voorbeeld</a:t>
+            </a:r>
+            <a:r>
+              <a:rPr lang="en-US" b="1" dirty="0"/>
+              <a:t> </a:t>
+            </a:r>
+            <a:r>
+              <a:rPr lang="en-US" b="1" dirty="0" err="1"/>
+              <a:t>wordt</a:t>
+            </a:r>
+            <a:r>
+              <a:rPr lang="en-US" b="1" dirty="0"/>
+              <a:t> </a:t>
+            </a:r>
+            <a:r>
+              <a:rPr lang="en-US" b="1" dirty="0" err="1"/>
+              <a:t>geen</a:t>
+            </a:r>
+            <a:r>
+              <a:rPr lang="en-US" b="1" dirty="0"/>
+              <a:t> outside local address </a:t>
+            </a:r>
+            <a:r>
+              <a:rPr lang="en-US" b="1" dirty="0" err="1"/>
+              <a:t>gebruikt</a:t>
+            </a:r>
+            <a:r>
+              <a:rPr lang="en-US" b="1" dirty="0"/>
+              <a:t>.</a:t>
+            </a:r>
           </a:p>
           <a:p>
             <a:pPr>
@@ -11408,7 +14641,7 @@
           <a:p>
             <a:r>
               <a:rPr lang="nl-BE" sz="2000" dirty="0"/>
-              <a:t>Static NAT maakt gebruik van een één-op-één mapping van lokale en globale adressen.</a:t>
+              <a:t>Static NAT maakt gebruik van een één-op-één mapping van local en global addresses.</a:t>
             </a:r>
           </a:p>
           <a:p>
@@ -11426,7 +14659,7 @@
           <a:p>
             <a:r>
               <a:rPr lang="nl-BE" sz="2000" dirty="0"/>
-              <a:t>Een netwerkbeheerder kan SSH’en naar een server in het lokale netwerkt door de SSH-client naar het juiste inside global address te verwijzen.</a:t>
+              <a:t>Een netwerkbeheerder kan SSH’en naar een server in het local network door de SSH-client naar het juiste inside global address te verwijzen.</a:t>
             </a:r>
             <a:endParaRPr lang="en-US" sz="2000" dirty="0"/>
           </a:p>
@@ -11930,6 +15163,27 @@
             </a:r>
           </a:p>
           <a:p>
+            <a:pPr marL="0" indent="0">
+              <a:buNone/>
+            </a:pPr>
+            <a:r>
+              <a:rPr lang="nl-BE" sz="2000" dirty="0"/>
+              <a:t>	vb.</a:t>
+            </a:r>
+          </a:p>
+          <a:p>
+            <a:pPr marL="0" indent="0">
+              <a:buNone/>
+            </a:pPr>
+            <a:r>
+              <a:rPr lang="nl-BE" sz="2000" dirty="0"/>
+              <a:t> </a:t>
+            </a:r>
+          </a:p>
+          <a:p>
+            <a:endParaRPr lang="nl-BE" sz="2000" dirty="0"/>
+          </a:p>
+          <a:p>
             <a:r>
               <a:rPr lang="nl-BE" sz="2000" dirty="0"/>
               <a:t>PAT staat ook bekend als NAT overload.</a:t>
@@ -11950,6 +15204,166 @@
           </a:p>
         </p:txBody>
       </p:sp>
+      <p:graphicFrame>
+        <p:nvGraphicFramePr>
+          <p:cNvPr id="5" name="Table 4"/>
+          <p:cNvGraphicFramePr>
+            <a:graphicFrameLocks noGrp="1"/>
+          </p:cNvGraphicFramePr>
+          <p:nvPr>
+            <p:extLst>
+              <p:ext uri="{D42A27DB-BD31-4B8C-83A1-F6EECF244321}">
+                <p14:modId xmlns:p14="http://schemas.microsoft.com/office/powerpoint/2010/main" val="2676359467"/>
+              </p:ext>
+            </p:extLst>
+          </p:nvPr>
+        </p:nvGraphicFramePr>
+        <p:xfrm>
+          <a:off x="1868245" y="2903070"/>
+          <a:ext cx="6096000" cy="1112520"/>
+        </p:xfrm>
+        <a:graphic>
+          <a:graphicData uri="http://schemas.openxmlformats.org/drawingml/2006/table">
+            <a:tbl>
+              <a:tblPr firstRow="1" bandRow="1">
+                <a:tableStyleId>{5C22544A-7EE6-4342-B048-85BDC9FD1C3A}</a:tableStyleId>
+              </a:tblPr>
+              <a:tblGrid>
+                <a:gridCol w="3048000">
+                  <a:extLst>
+                    <a:ext uri="{9D8B030D-6E8A-4147-A177-3AD203B41FA5}">
+                      <a16:colId xmlns:a16="http://schemas.microsoft.com/office/drawing/2014/main" val="963693253"/>
+                    </a:ext>
+                  </a:extLst>
+                </a:gridCol>
+                <a:gridCol w="3048000">
+                  <a:extLst>
+                    <a:ext uri="{9D8B030D-6E8A-4147-A177-3AD203B41FA5}">
+                      <a16:colId xmlns:a16="http://schemas.microsoft.com/office/drawing/2014/main" val="2002915215"/>
+                    </a:ext>
+                  </a:extLst>
+                </a:gridCol>
+              </a:tblGrid>
+              <a:tr h="370840">
+                <a:tc>
+                  <a:txBody>
+                    <a:bodyPr/>
+                    <a:lstStyle/>
+                    <a:p>
+                      <a:r>
+                        <a:rPr lang="nl-BE" dirty="0"/>
+                        <a:t>Inside local address</a:t>
+                      </a:r>
+                    </a:p>
+                  </a:txBody>
+                  <a:tcPr/>
+                </a:tc>
+                <a:tc>
+                  <a:txBody>
+                    <a:bodyPr/>
+                    <a:lstStyle/>
+                    <a:p>
+                      <a:r>
+                        <a:rPr lang="nl-BE" dirty="0"/>
+                        <a:t>Inside global address</a:t>
+                      </a:r>
+                    </a:p>
+                  </a:txBody>
+                  <a:tcPr/>
+                </a:tc>
+                <a:extLst>
+                  <a:ext uri="{0D108BD9-81ED-4DB2-BD59-A6C34878D82A}">
+                    <a16:rowId xmlns:a16="http://schemas.microsoft.com/office/drawing/2014/main" val="4130694349"/>
+                  </a:ext>
+                </a:extLst>
+              </a:tr>
+              <a:tr h="370840">
+                <a:tc>
+                  <a:txBody>
+                    <a:bodyPr/>
+                    <a:lstStyle/>
+                    <a:p>
+                      <a:r>
+                        <a:rPr lang="nl-BE" dirty="0"/>
+                        <a:t>192.168.10.11:8080</a:t>
+                      </a:r>
+                    </a:p>
+                  </a:txBody>
+                  <a:tcPr/>
+                </a:tc>
+                <a:tc>
+                  <a:txBody>
+                    <a:bodyPr/>
+                    <a:lstStyle/>
+                    <a:p>
+                      <a:r>
+                        <a:rPr lang="nl-BE" dirty="0"/>
+                        <a:t>209.165.200.226:8080</a:t>
+                      </a:r>
+                    </a:p>
+                  </a:txBody>
+                  <a:tcPr/>
+                </a:tc>
+                <a:extLst>
+                  <a:ext uri="{0D108BD9-81ED-4DB2-BD59-A6C34878D82A}">
+                    <a16:rowId xmlns:a16="http://schemas.microsoft.com/office/drawing/2014/main" val="147963183"/>
+                  </a:ext>
+                </a:extLst>
+              </a:tr>
+              <a:tr h="370840">
+                <a:tc>
+                  <a:txBody>
+                    <a:bodyPr/>
+                    <a:lstStyle/>
+                    <a:p>
+                      <a:r>
+                        <a:rPr lang="nl-BE" dirty="0"/>
+                        <a:t>192.168.10.12:8080</a:t>
+                      </a:r>
+                    </a:p>
+                  </a:txBody>
+                  <a:tcPr/>
+                </a:tc>
+                <a:tc>
+                  <a:txBody>
+                    <a:bodyPr/>
+                    <a:lstStyle/>
+                    <a:p>
+                      <a:pPr marL="0" marR="0" lvl="0" indent="0" algn="l" defTabSz="914400" rtl="0" eaLnBrk="1" fontAlgn="auto" latinLnBrk="0" hangingPunct="1">
+                        <a:lnSpc>
+                          <a:spcPct val="100000"/>
+                        </a:lnSpc>
+                        <a:spcBef>
+                          <a:spcPts val="0"/>
+                        </a:spcBef>
+                        <a:spcAft>
+                          <a:spcPts val="0"/>
+                        </a:spcAft>
+                        <a:buClrTx/>
+                        <a:buSzTx/>
+                        <a:buFontTx/>
+                        <a:buNone/>
+                        <a:tabLst/>
+                        <a:defRPr/>
+                      </a:pPr>
+                      <a:r>
+                        <a:rPr lang="nl-BE" dirty="0"/>
+                        <a:t>209.165.200.226:8081</a:t>
+                      </a:r>
+                    </a:p>
+                  </a:txBody>
+                  <a:tcPr/>
+                </a:tc>
+                <a:extLst>
+                  <a:ext uri="{0D108BD9-81ED-4DB2-BD59-A6C34878D82A}">
+                    <a16:rowId xmlns:a16="http://schemas.microsoft.com/office/drawing/2014/main" val="727457975"/>
+                  </a:ext>
+                </a:extLst>
+              </a:tr>
+            </a:tbl>
+          </a:graphicData>
+        </a:graphic>
+      </p:graphicFrame>
     </p:spTree>
     <p:extLst>
       <p:ext uri="{BB962C8B-B14F-4D97-AF65-F5344CB8AC3E}">
@@ -12073,19 +15487,19 @@
           <a:p>
             <a:r>
               <a:rPr lang="nl-BE" sz="2000" dirty="0"/>
-              <a:t>NAT forwards binnenkomende pakketten naar hun inside destination door te verwijzen naar het incoming source IPv4 address dat door de host op het public network gegeven wordt.</a:t>
+              <a:t>NAT forward binnenkomende pakketten naar hun inside destination door te verwijzen naar het incoming source IPv4 address dat door de host op het public network gegeven wordt.</a:t>
             </a:r>
           </a:p>
           <a:p>
             <a:r>
               <a:rPr lang="nl-BE" sz="2000" dirty="0"/>
-              <a:t>Bij PAT is er over het algemeen slechts één of een zeer weinig publiek blootgestelde IPv4-adressen.</a:t>
+              <a:t>Bij PAT is er over het algemeen slechts één of een zeer weinig public IP addresses.</a:t>
             </a:r>
           </a:p>
           <a:p>
             <a:r>
               <a:rPr lang="nl-BE" sz="2000" dirty="0"/>
-              <a:t>PAT kan protocollen vertalen die geen poortnummers gebruiken, zoals ICMP; Elk van deze protocollen wordt anders door PAT ondersteund.</a:t>
+              <a:t>PAT kan protocollen vertalen die geen Layer 4 portnummer gebruiken, zoals ICMP; Elk van deze protocollen wordt anders door PAT ondersteund.</a:t>
             </a:r>
             <a:endParaRPr lang="en-US" sz="2000" dirty="0"/>
           </a:p>
@@ -12325,31 +15739,31 @@
           <a:p>
             <a:r>
               <a:rPr lang="en-US" sz="2000" dirty="0"/>
-              <a:t>Performance is degraded</a:t>
+              <a:t>Minder performance</a:t>
             </a:r>
           </a:p>
           <a:p>
             <a:r>
               <a:rPr lang="pt-BR" sz="2000" dirty="0"/>
-              <a:t>End-to-end functionality is degraded</a:t>
+              <a:t>Minder end-to-end functionaliteit</a:t>
             </a:r>
           </a:p>
           <a:p>
             <a:r>
               <a:rPr lang="pt-BR" sz="2000" dirty="0"/>
-              <a:t>End-to-end IP traceability is lost</a:t>
+              <a:t>Geen End-to-end IP traceability meer</a:t>
             </a:r>
           </a:p>
           <a:p>
             <a:r>
               <a:rPr lang="pt-BR" sz="2000" dirty="0"/>
-              <a:t>Tunneling is more complicated</a:t>
+              <a:t>Tunneling is ingewikkelder</a:t>
             </a:r>
           </a:p>
           <a:p>
             <a:r>
               <a:rPr lang="pt-BR" sz="2000" dirty="0"/>
-              <a:t>Initiating TCP connections can be disrupted</a:t>
+              <a:t>Het initieren van TCP connections kan onderbroken worden</a:t>
             </a:r>
           </a:p>
         </p:txBody>
@@ -15559,13 +18973,13 @@
           <a:p>
             <a:r>
               <a:rPr lang="nl-BE" sz="2000" dirty="0"/>
-              <a:t>Private adressen worden niet geroute door internet routers terwijl openbare adressen dit wel worden,</a:t>
+              <a:t>Private adressen worden niet geroute door internet routers terwijl openbare adressen dit wel worden.</a:t>
             </a:r>
           </a:p>
           <a:p>
             <a:r>
               <a:rPr lang="nl-BE" sz="2000" dirty="0"/>
-              <a:t>Private addresses kunnen de tekortkoming aan IPv4-adresruimte verminderen, maar omdat ze niet door internetapparaten worden gerouteerd, moeten ze eerst vertaald worden.</a:t>
+              <a:t>Private addresses kunnen het probleem van de tekortkoming aan IPv4-adresruimte tijdelijk verhelpen, maar omdat ze niet door internetapparaten worden gerouteerd, moeten ze eerst vertaald worden.</a:t>
             </a:r>
           </a:p>
           <a:p>
@@ -16283,7 +19697,7 @@
           <a:p>
             <a:r>
               <a:rPr lang="nl-BE" sz="2000" dirty="0"/>
-              <a:t>NAT behoudt de public address space en bespaart aanzienlijke administratieve kosten in het beheren van adds, moves en changes</a:t>
+              <a:t>NAT behoudt de public address space en bespaart aanzienlijke administratieve kosten in het toevoegen, verplaatsen en wijzigen van devices in het netwerk</a:t>
             </a:r>
             <a:r>
               <a:rPr lang="en-US" sz="2000" dirty="0"/>
@@ -16319,7 +19733,7 @@
             </a:r>
             <a:r>
               <a:rPr lang="en-US" dirty="0"/>
-              <a:t>overloading</a:t>
+              <a:t>overloading (PAT)</a:t>
             </a:r>
           </a:p>
           <a:p>

</xml_diff>